<commit_message>
latest from oridinal fork plus ppt images
</commit_message>
<xml_diff>
--- a/result.pptx
+++ b/result.pptx
@@ -315,7 +315,7 @@
               </a:lnSpc>
               <a:buNone/>
             </a:pPr>
-            <a:fld id="{0FC9EB0A-8382-4E69-8996-4F9CDBCC0982}" type="slidenum">
+            <a:fld id="{A1A109A2-A512-46AD-9387-1890526E9A50}" type="slidenum">
               <a:rPr b="0" lang="en-CA" sz="1400" strike="noStrike" u="none">
                 <a:solidFill>
                   <a:srgbClr val="000000"/>
@@ -361,7 +361,7 @@
       </p:grpSpPr>
       <p:sp>
         <p:nvSpPr>
-          <p:cNvPr id="174" name="Slide Number Placeholder 6"/>
+          <p:cNvPr id="166" name="Slide Number Placeholder 6"/>
           <p:cNvSpPr txBox="1"/>
           <p:nvPr/>
         </p:nvSpPr>
@@ -388,7 +388,7 @@
                 <a:spcPct val="100000"/>
               </a:lnSpc>
             </a:pPr>
-            <a:fld id="{55DD879F-50A3-417D-A870-DB70DEB25ADF}" type="slidenum">
+            <a:fld id="{600E3E23-279B-43E4-BF6C-448B1F267F56}" type="slidenum">
               <a:rPr b="0" lang="en-CA" sz="1400" strike="noStrike" u="none">
                 <a:solidFill>
                   <a:srgbClr val="000000"/>
@@ -411,7 +411,7 @@
       </p:sp>
       <p:sp>
         <p:nvSpPr>
-          <p:cNvPr id="175" name="Slide Number Placeholder 6"/>
+          <p:cNvPr id="167" name="Slide Number Placeholder 6"/>
           <p:cNvSpPr txBox="1"/>
           <p:nvPr/>
         </p:nvSpPr>
@@ -438,7 +438,7 @@
                 <a:spcPct val="100000"/>
               </a:lnSpc>
             </a:pPr>
-            <a:fld id="{DCD55A7C-96D2-4723-9296-E5B8B532AB93}" type="slidenum">
+            <a:fld id="{1FC2AB03-EEF9-4223-9DAD-AB567FBD3518}" type="slidenum">
               <a:rPr b="0" lang="en-CA" sz="1400" strike="noStrike" u="none">
                 <a:solidFill>
                   <a:srgbClr val="000000"/>
@@ -461,7 +461,7 @@
       </p:sp>
       <p:sp>
         <p:nvSpPr>
-          <p:cNvPr id="176" name="PlaceHolder 1"/>
+          <p:cNvPr id="168" name="PlaceHolder 1"/>
           <p:cNvSpPr>
             <a:spLocks noGrp="1"/>
           </p:cNvSpPr>
@@ -484,7 +484,7 @@
       </p:sp>
       <p:sp>
         <p:nvSpPr>
-          <p:cNvPr id="177" name="PlaceHolder 2"/>
+          <p:cNvPr id="169" name="PlaceHolder 2"/>
           <p:cNvSpPr>
             <a:spLocks noGrp="1"/>
           </p:cNvSpPr>
@@ -547,7 +547,7 @@
       </p:grpSpPr>
       <p:sp>
         <p:nvSpPr>
-          <p:cNvPr id="202" name="Slide Number Placeholder 6"/>
+          <p:cNvPr id="194" name="Slide Number Placeholder 6"/>
           <p:cNvSpPr txBox="1"/>
           <p:nvPr/>
         </p:nvSpPr>
@@ -574,7 +574,7 @@
                 <a:spcPct val="100000"/>
               </a:lnSpc>
             </a:pPr>
-            <a:fld id="{3980CD2B-D5D4-4CF9-AF28-6F701FED303B}" type="slidenum">
+            <a:fld id="{6C9860AD-069A-48F7-BD80-9DC76041C421}" type="slidenum">
               <a:rPr b="0" lang="en-CA" sz="1400" strike="noStrike" u="none">
                 <a:solidFill>
                   <a:srgbClr val="000000"/>
@@ -597,7 +597,7 @@
       </p:sp>
       <p:sp>
         <p:nvSpPr>
-          <p:cNvPr id="203" name="PlaceHolder 1"/>
+          <p:cNvPr id="195" name="PlaceHolder 1"/>
           <p:cNvSpPr>
             <a:spLocks noGrp="1"/>
           </p:cNvSpPr>
@@ -620,7 +620,7 @@
       </p:sp>
       <p:sp>
         <p:nvSpPr>
-          <p:cNvPr id="204" name="PlaceHolder 2"/>
+          <p:cNvPr id="196" name="PlaceHolder 2"/>
           <p:cNvSpPr>
             <a:spLocks noGrp="1"/>
           </p:cNvSpPr>
@@ -683,7 +683,7 @@
       </p:grpSpPr>
       <p:sp>
         <p:nvSpPr>
-          <p:cNvPr id="178" name="Slide Number Placeholder 6"/>
+          <p:cNvPr id="170" name="Slide Number Placeholder 6"/>
           <p:cNvSpPr txBox="1"/>
           <p:nvPr/>
         </p:nvSpPr>
@@ -710,7 +710,7 @@
                 <a:spcPct val="100000"/>
               </a:lnSpc>
             </a:pPr>
-            <a:fld id="{14761ECE-3BEA-4C71-A353-8995C2FDA5AF}" type="slidenum">
+            <a:fld id="{6B157734-5120-4920-ADFC-76D2421EDA9D}" type="slidenum">
               <a:rPr b="0" lang="en-CA" sz="1400" strike="noStrike" u="none">
                 <a:solidFill>
                   <a:srgbClr val="000000"/>
@@ -733,7 +733,7 @@
       </p:sp>
       <p:sp>
         <p:nvSpPr>
-          <p:cNvPr id="179" name="PlaceHolder 1"/>
+          <p:cNvPr id="171" name="PlaceHolder 1"/>
           <p:cNvSpPr>
             <a:spLocks noGrp="1"/>
           </p:cNvSpPr>
@@ -756,7 +756,7 @@
       </p:sp>
       <p:sp>
         <p:nvSpPr>
-          <p:cNvPr id="180" name="PlaceHolder 2"/>
+          <p:cNvPr id="172" name="PlaceHolder 2"/>
           <p:cNvSpPr>
             <a:spLocks noGrp="1"/>
           </p:cNvSpPr>
@@ -819,7 +819,7 @@
       </p:grpSpPr>
       <p:sp>
         <p:nvSpPr>
-          <p:cNvPr id="181" name="Slide Number Placeholder 6"/>
+          <p:cNvPr id="173" name="Slide Number Placeholder 6"/>
           <p:cNvSpPr txBox="1"/>
           <p:nvPr/>
         </p:nvSpPr>
@@ -846,7 +846,7 @@
                 <a:spcPct val="100000"/>
               </a:lnSpc>
             </a:pPr>
-            <a:fld id="{42E06032-4281-4B29-B4A5-ADEA9838BB6C}" type="slidenum">
+            <a:fld id="{73F07B88-AFBB-4774-9786-54A3D66E64C7}" type="slidenum">
               <a:rPr b="0" lang="en-CA" sz="1400" strike="noStrike" u="none">
                 <a:solidFill>
                   <a:srgbClr val="000000"/>
@@ -869,7 +869,7 @@
       </p:sp>
       <p:sp>
         <p:nvSpPr>
-          <p:cNvPr id="182" name="PlaceHolder 1"/>
+          <p:cNvPr id="174" name="PlaceHolder 1"/>
           <p:cNvSpPr>
             <a:spLocks noGrp="1"/>
           </p:cNvSpPr>
@@ -892,7 +892,7 @@
       </p:sp>
       <p:sp>
         <p:nvSpPr>
-          <p:cNvPr id="183" name="PlaceHolder 2"/>
+          <p:cNvPr id="175" name="PlaceHolder 2"/>
           <p:cNvSpPr>
             <a:spLocks noGrp="1"/>
           </p:cNvSpPr>
@@ -955,7 +955,7 @@
       </p:grpSpPr>
       <p:sp>
         <p:nvSpPr>
-          <p:cNvPr id="184" name="Slide Number Placeholder 6"/>
+          <p:cNvPr id="176" name="Slide Number Placeholder 6"/>
           <p:cNvSpPr txBox="1"/>
           <p:nvPr/>
         </p:nvSpPr>
@@ -982,7 +982,7 @@
                 <a:spcPct val="100000"/>
               </a:lnSpc>
             </a:pPr>
-            <a:fld id="{13CF5508-8867-41F2-A031-D08ACF3E92DE}" type="slidenum">
+            <a:fld id="{480B2D22-7481-42FD-A968-695B3D372FBA}" type="slidenum">
               <a:rPr b="0" lang="en-CA" sz="1400" strike="noStrike" u="none">
                 <a:solidFill>
                   <a:srgbClr val="000000"/>
@@ -1005,7 +1005,7 @@
       </p:sp>
       <p:sp>
         <p:nvSpPr>
-          <p:cNvPr id="185" name="PlaceHolder 1"/>
+          <p:cNvPr id="177" name="PlaceHolder 1"/>
           <p:cNvSpPr>
             <a:spLocks noGrp="1"/>
           </p:cNvSpPr>
@@ -1028,7 +1028,7 @@
       </p:sp>
       <p:sp>
         <p:nvSpPr>
-          <p:cNvPr id="186" name="PlaceHolder 2"/>
+          <p:cNvPr id="178" name="PlaceHolder 2"/>
           <p:cNvSpPr>
             <a:spLocks noGrp="1"/>
           </p:cNvSpPr>
@@ -1091,7 +1091,7 @@
       </p:grpSpPr>
       <p:sp>
         <p:nvSpPr>
-          <p:cNvPr id="187" name="Slide Number Placeholder 6"/>
+          <p:cNvPr id="179" name="Slide Number Placeholder 6"/>
           <p:cNvSpPr txBox="1"/>
           <p:nvPr/>
         </p:nvSpPr>
@@ -1118,7 +1118,7 @@
                 <a:spcPct val="100000"/>
               </a:lnSpc>
             </a:pPr>
-            <a:fld id="{926C33D8-CD4B-4F45-984B-A9FBB4A57448}" type="slidenum">
+            <a:fld id="{972B4AEC-E632-4998-B5DF-529A7427B04D}" type="slidenum">
               <a:rPr b="0" lang="en-CA" sz="1400" strike="noStrike" u="none">
                 <a:solidFill>
                   <a:srgbClr val="000000"/>
@@ -1141,7 +1141,7 @@
       </p:sp>
       <p:sp>
         <p:nvSpPr>
-          <p:cNvPr id="188" name="PlaceHolder 1"/>
+          <p:cNvPr id="180" name="PlaceHolder 1"/>
           <p:cNvSpPr>
             <a:spLocks noGrp="1"/>
           </p:cNvSpPr>
@@ -1164,7 +1164,7 @@
       </p:sp>
       <p:sp>
         <p:nvSpPr>
-          <p:cNvPr id="189" name="PlaceHolder 2"/>
+          <p:cNvPr id="181" name="PlaceHolder 2"/>
           <p:cNvSpPr>
             <a:spLocks noGrp="1"/>
           </p:cNvSpPr>
@@ -1227,7 +1227,7 @@
       </p:grpSpPr>
       <p:sp>
         <p:nvSpPr>
-          <p:cNvPr id="190" name="Slide Number Placeholder 6"/>
+          <p:cNvPr id="182" name="Slide Number Placeholder 6"/>
           <p:cNvSpPr txBox="1"/>
           <p:nvPr/>
         </p:nvSpPr>
@@ -1254,7 +1254,7 @@
                 <a:spcPct val="100000"/>
               </a:lnSpc>
             </a:pPr>
-            <a:fld id="{E0AF2028-269F-4E05-A4DA-2168A6538C81}" type="slidenum">
+            <a:fld id="{842C3919-BDD7-4261-84AB-014E6CE2E464}" type="slidenum">
               <a:rPr b="0" lang="en-CA" sz="1400" strike="noStrike" u="none">
                 <a:solidFill>
                   <a:srgbClr val="000000"/>
@@ -1277,7 +1277,7 @@
       </p:sp>
       <p:sp>
         <p:nvSpPr>
-          <p:cNvPr id="191" name="PlaceHolder 1"/>
+          <p:cNvPr id="183" name="PlaceHolder 1"/>
           <p:cNvSpPr>
             <a:spLocks noGrp="1"/>
           </p:cNvSpPr>
@@ -1300,7 +1300,7 @@
       </p:sp>
       <p:sp>
         <p:nvSpPr>
-          <p:cNvPr id="192" name="PlaceHolder 2"/>
+          <p:cNvPr id="184" name="PlaceHolder 2"/>
           <p:cNvSpPr>
             <a:spLocks noGrp="1"/>
           </p:cNvSpPr>
@@ -1363,7 +1363,7 @@
       </p:grpSpPr>
       <p:sp>
         <p:nvSpPr>
-          <p:cNvPr id="193" name="Slide Number Placeholder 6"/>
+          <p:cNvPr id="185" name="Slide Number Placeholder 6"/>
           <p:cNvSpPr txBox="1"/>
           <p:nvPr/>
         </p:nvSpPr>
@@ -1390,7 +1390,7 @@
                 <a:spcPct val="100000"/>
               </a:lnSpc>
             </a:pPr>
-            <a:fld id="{9A401591-5350-40FB-8214-50CA9AB3A458}" type="slidenum">
+            <a:fld id="{FFD1E585-AE32-4E45-BADB-2EF84D748A0E}" type="slidenum">
               <a:rPr b="0" lang="en-CA" sz="1400" strike="noStrike" u="none">
                 <a:solidFill>
                   <a:srgbClr val="000000"/>
@@ -1413,7 +1413,7 @@
       </p:sp>
       <p:sp>
         <p:nvSpPr>
-          <p:cNvPr id="194" name="PlaceHolder 1"/>
+          <p:cNvPr id="186" name="PlaceHolder 1"/>
           <p:cNvSpPr>
             <a:spLocks noGrp="1"/>
           </p:cNvSpPr>
@@ -1436,7 +1436,7 @@
       </p:sp>
       <p:sp>
         <p:nvSpPr>
-          <p:cNvPr id="195" name="PlaceHolder 2"/>
+          <p:cNvPr id="187" name="PlaceHolder 2"/>
           <p:cNvSpPr>
             <a:spLocks noGrp="1"/>
           </p:cNvSpPr>
@@ -1499,7 +1499,7 @@
       </p:grpSpPr>
       <p:sp>
         <p:nvSpPr>
-          <p:cNvPr id="196" name="Slide Number Placeholder 6"/>
+          <p:cNvPr id="188" name="Slide Number Placeholder 6"/>
           <p:cNvSpPr txBox="1"/>
           <p:nvPr/>
         </p:nvSpPr>
@@ -1526,7 +1526,7 @@
                 <a:spcPct val="100000"/>
               </a:lnSpc>
             </a:pPr>
-            <a:fld id="{7FB56A57-1C45-4A5F-B2C6-5D94E426613C}" type="slidenum">
+            <a:fld id="{91BE2C86-8C15-4B2F-992F-DB7D04A9DAB9}" type="slidenum">
               <a:rPr b="0" lang="en-CA" sz="1400" strike="noStrike" u="none">
                 <a:solidFill>
                   <a:srgbClr val="000000"/>
@@ -1549,7 +1549,7 @@
       </p:sp>
       <p:sp>
         <p:nvSpPr>
-          <p:cNvPr id="197" name="PlaceHolder 1"/>
+          <p:cNvPr id="189" name="PlaceHolder 1"/>
           <p:cNvSpPr>
             <a:spLocks noGrp="1"/>
           </p:cNvSpPr>
@@ -1572,7 +1572,7 @@
       </p:sp>
       <p:sp>
         <p:nvSpPr>
-          <p:cNvPr id="198" name="PlaceHolder 2"/>
+          <p:cNvPr id="190" name="PlaceHolder 2"/>
           <p:cNvSpPr>
             <a:spLocks noGrp="1"/>
           </p:cNvSpPr>
@@ -1635,7 +1635,7 @@
       </p:grpSpPr>
       <p:sp>
         <p:nvSpPr>
-          <p:cNvPr id="199" name="Slide Number Placeholder 6"/>
+          <p:cNvPr id="191" name="Slide Number Placeholder 6"/>
           <p:cNvSpPr txBox="1"/>
           <p:nvPr/>
         </p:nvSpPr>
@@ -1662,7 +1662,7 @@
                 <a:spcPct val="100000"/>
               </a:lnSpc>
             </a:pPr>
-            <a:fld id="{29443407-8F74-4EEB-A8EC-77B55D09BB9E}" type="slidenum">
+            <a:fld id="{D6CC72C7-D9F8-4F6E-967E-87F0763FBE00}" type="slidenum">
               <a:rPr b="0" lang="en-CA" sz="1400" strike="noStrike" u="none">
                 <a:solidFill>
                   <a:srgbClr val="000000"/>
@@ -1685,7 +1685,7 @@
       </p:sp>
       <p:sp>
         <p:nvSpPr>
-          <p:cNvPr id="200" name="PlaceHolder 1"/>
+          <p:cNvPr id="192" name="PlaceHolder 1"/>
           <p:cNvSpPr>
             <a:spLocks noGrp="1"/>
           </p:cNvSpPr>
@@ -1708,7 +1708,7 @@
       </p:sp>
       <p:sp>
         <p:nvSpPr>
-          <p:cNvPr id="201" name="PlaceHolder 2"/>
+          <p:cNvPr id="193" name="PlaceHolder 2"/>
           <p:cNvSpPr>
             <a:spLocks noGrp="1"/>
           </p:cNvSpPr>
@@ -2108,7 +2108,7 @@
         <p:txBody>
           <a:bodyPr/>
           <a:p>
-            <a:fld id="{4990D601-C597-47D5-AC24-68EE86A21D8F}" type="slidenum">
+            <a:fld id="{3718B0E2-8079-4186-B36B-A8D36FE33DA3}" type="slidenum">
               <a:t>&lt;#&gt;</a:t>
             </a:fld>
           </a:p>
@@ -2496,7 +2496,7 @@
         <p:txBody>
           <a:bodyPr/>
           <a:p>
-            <a:fld id="{BFA753E9-C3FA-43B6-B386-33CA0E841E2E}" type="slidenum">
+            <a:fld id="{1A05D820-0427-4763-929E-FBA4B95BE309}" type="slidenum">
               <a:t>&lt;#&gt;</a:t>
             </a:fld>
           </a:p>
@@ -2884,7 +2884,7 @@
         <p:txBody>
           <a:bodyPr/>
           <a:p>
-            <a:fld id="{A81351DA-8EFD-40A0-B85C-AAB53B62C043}" type="slidenum">
+            <a:fld id="{C5CC04F0-E05C-47EF-9E41-C30B1C13CD39}" type="slidenum">
               <a:t>&lt;#&gt;</a:t>
             </a:fld>
           </a:p>
@@ -3272,7 +3272,7 @@
         <p:txBody>
           <a:bodyPr/>
           <a:p>
-            <a:fld id="{0C7701B4-6E2C-48D8-B66B-C5DC8C3C8DF9}" type="slidenum">
+            <a:fld id="{21C54587-EA3C-4E57-8E50-DD2F07CE40F4}" type="slidenum">
               <a:t>&lt;#&gt;</a:t>
             </a:fld>
           </a:p>
@@ -3660,7 +3660,7 @@
         <p:txBody>
           <a:bodyPr/>
           <a:p>
-            <a:fld id="{802BA549-72DC-46FA-9EE5-354A65D56005}" type="slidenum">
+            <a:fld id="{CE74AC9F-FCBF-43D6-9EF7-8020CCE2D9F3}" type="slidenum">
               <a:t>&lt;#&gt;</a:t>
             </a:fld>
           </a:p>
@@ -4048,7 +4048,7 @@
         <p:txBody>
           <a:bodyPr/>
           <a:p>
-            <a:fld id="{92E34661-02C3-4431-AD5A-7E4637DC02C5}" type="slidenum">
+            <a:fld id="{EC6A26F2-CB31-41F8-B360-6EF0B30112E7}" type="slidenum">
               <a:t>&lt;#&gt;</a:t>
             </a:fld>
           </a:p>
@@ -4436,7 +4436,7 @@
         <p:txBody>
           <a:bodyPr/>
           <a:p>
-            <a:fld id="{8CD697EA-1AE1-4A3D-887D-77414C89CDBF}" type="slidenum">
+            <a:fld id="{50A106CF-956E-4A5E-A5BC-AB52EC5BBC32}" type="slidenum">
               <a:t>&lt;#&gt;</a:t>
             </a:fld>
           </a:p>
@@ -4824,7 +4824,7 @@
         <p:txBody>
           <a:bodyPr/>
           <a:p>
-            <a:fld id="{FA124C92-57C3-4517-B335-003E10C7394F}" type="slidenum">
+            <a:fld id="{FC7EFC5D-FA92-4678-9C1F-2A77B011E805}" type="slidenum">
               <a:t>&lt;#&gt;</a:t>
             </a:fld>
           </a:p>
@@ -5252,7 +5252,7 @@
               </a:lnSpc>
               <a:buNone/>
             </a:pPr>
-            <a:fld id="{BE84DADF-CC2A-4BF6-AE6C-7455B7972BFE}" type="slidenum">
+            <a:fld id="{E5B7D1C2-215F-4CE5-BCC2-153ABD6AE729}" type="slidenum">
               <a:rPr b="0" lang="en-CA" sz="1400" strike="noStrike" u="none">
                 <a:solidFill>
                   <a:srgbClr val="000000"/>
@@ -5597,7 +5597,7 @@
               </a:lnSpc>
               <a:buNone/>
             </a:pPr>
-            <a:fld id="{09B123EE-DB72-4795-84EE-B2CAD678BB8D}" type="slidenum">
+            <a:fld id="{E399FF53-4DF6-46DA-AF2E-EBF4807AC6D3}" type="slidenum">
               <a:rPr b="0" lang="en-CA" sz="1400" strike="noStrike" u="none">
                 <a:solidFill>
                   <a:srgbClr val="000000"/>
@@ -6035,7 +6035,7 @@
               </a:lnSpc>
               <a:buNone/>
             </a:pPr>
-            <a:fld id="{0BEBEF38-E456-4AB5-8136-DB59E89C61D8}" type="slidenum">
+            <a:fld id="{7E9BA907-26DB-4506-AD14-A3F95DEA3510}" type="slidenum">
               <a:rPr b="0" lang="en-CA" sz="1400" strike="noStrike" u="none">
                 <a:solidFill>
                   <a:srgbClr val="000000"/>
@@ -6473,7 +6473,7 @@
               </a:lnSpc>
               <a:buNone/>
             </a:pPr>
-            <a:fld id="{F677E575-9D64-46D4-875A-9FCFD955F8CC}" type="slidenum">
+            <a:fld id="{1C478280-DA4F-4295-986D-0F16617A1EC8}" type="slidenum">
               <a:rPr b="0" lang="en-CA" sz="1400" strike="noStrike" u="none">
                 <a:solidFill>
                   <a:srgbClr val="000000"/>
@@ -6712,7 +6712,7 @@
               </a:lnSpc>
               <a:buNone/>
             </a:pPr>
-            <a:fld id="{62055D41-4197-4BBB-9D4B-0627AE71BD67}" type="slidenum">
+            <a:fld id="{68E194B7-FB98-416A-B327-52EB0BD06580}" type="slidenum">
               <a:rPr b="0" lang="en-CA" sz="1400" strike="noStrike" u="none">
                 <a:solidFill>
                   <a:srgbClr val="000000"/>
@@ -7143,7 +7143,7 @@
               </a:lnSpc>
               <a:buNone/>
             </a:pPr>
-            <a:fld id="{4490D2CC-E6BB-4CF4-AAA0-EBB22B958BDD}" type="slidenum">
+            <a:fld id="{596EAE35-549C-4D4D-85D0-64322C86A172}" type="slidenum">
               <a:rPr b="0" lang="en-CA" sz="1400" strike="noStrike" u="none">
                 <a:solidFill>
                   <a:srgbClr val="000000"/>
@@ -7447,7 +7447,7 @@
               </a:lnSpc>
               <a:buNone/>
             </a:pPr>
-            <a:fld id="{C4EFDBA9-A784-4D6F-B546-2667E9852082}" type="slidenum">
+            <a:fld id="{E1C14116-AF01-41DC-807D-040F5CFF78FE}" type="slidenum">
               <a:rPr b="0" lang="en-CA" sz="1400" strike="noStrike" u="none">
                 <a:solidFill>
                   <a:srgbClr val="000000"/>
@@ -8068,7 +8068,7 @@
               </a:lnSpc>
               <a:buNone/>
             </a:pPr>
-            <a:fld id="{C45B224C-33BC-43D9-8602-16B3D847D972}" type="slidenum">
+            <a:fld id="{9DFB7E1D-222D-4665-B48F-91A5821A17CB}" type="slidenum">
               <a:rPr b="0" lang="en-CA" sz="1400" strike="noStrike" u="none">
                 <a:solidFill>
                   <a:srgbClr val="000000"/>
@@ -8809,7 +8809,7 @@
               </a:lnSpc>
               <a:buNone/>
             </a:pPr>
-            <a:fld id="{976524D1-093D-4896-99DB-58075C508C37}" type="slidenum">
+            <a:fld id="{71D31B96-60F9-4A21-8B4B-97CE1E07FBF1}" type="slidenum">
               <a:rPr b="0" lang="en-CA" sz="1400" strike="noStrike" u="none">
                 <a:solidFill>
                   <a:srgbClr val="000000"/>
@@ -9080,7 +9080,7 @@
               </a:lnSpc>
               <a:buNone/>
             </a:pPr>
-            <a:fld id="{D807EFB4-4CF6-4269-8332-A6545A3C3FD0}" type="slidenum">
+            <a:fld id="{A155862C-1AE0-4444-B3AC-2D12FA24486D}" type="slidenum">
               <a:rPr b="0" lang="en-CA" sz="1400" strike="noStrike" u="none">
                 <a:solidFill>
                   <a:srgbClr val="000000"/>
@@ -9310,7 +9310,7 @@
               </a:lnSpc>
               <a:buNone/>
             </a:pPr>
-            <a:fld id="{B4AA05A2-E266-46DF-AD13-4C9B8CE66F15}" type="slidenum">
+            <a:fld id="{F1ED53EB-9018-4D0E-9641-64D87E000C29}" type="slidenum">
               <a:rPr b="0" lang="en-CA" sz="1400" strike="noStrike" u="none">
                 <a:solidFill>
                   <a:srgbClr val="000000"/>
@@ -9889,7 +9889,7 @@
               </a:lnSpc>
               <a:buNone/>
             </a:pPr>
-            <a:fld id="{B110E949-0C5A-4CAB-A6B5-C528057E123E}" type="slidenum">
+            <a:fld id="{06A1FB66-B7C6-4D47-BECC-B1A4A469FF78}" type="slidenum">
               <a:rPr b="0" lang="en-CA" sz="1400" strike="noStrike" u="none">
                 <a:solidFill>
                   <a:srgbClr val="000000"/>
@@ -10213,7 +10213,7 @@
       </p:grpSpPr>
       <p:sp>
         <p:nvSpPr>
-          <p:cNvPr id="169" name="PlaceHolder 1"/>
+          <p:cNvPr id="162" name="PlaceHolder 1"/>
           <p:cNvSpPr>
             <a:spLocks noGrp="1"/>
           </p:cNvSpPr>
@@ -10296,18 +10296,12 @@
       </p:sp>
       <p:pic>
         <p:nvPicPr>
-          <p:cNvPr id="170" name="Graphic 1" descr=""/>
+          <p:cNvPr id="163" name="Graphic 1" descr=""/>
           <p:cNvPicPr/>
           <p:nvPr/>
         </p:nvPicPr>
         <p:blipFill>
-          <a:blip r:embed="rId1">
-            <a:extLst>
-              <a:ext uri="{96DAC541-7B7A-43D3-8B79-37D633B846F1}">
-                <asvg:svgBlip xmlns:asvg="http://schemas.microsoft.com/office/drawing/2016/SVG/main" r:embed="rId2"/>
-              </a:ext>
-            </a:extLst>
-          </a:blip>
+          <a:blip r:embed="rId1"/>
           <a:stretch/>
         </p:blipFill>
         <p:spPr>
@@ -10325,7 +10319,7 @@
       </p:pic>
       <p:sp>
         <p:nvSpPr>
-          <p:cNvPr id="171" name="Rectangle 3"/>
+          <p:cNvPr id="164" name="Rectangle 3"/>
           <p:cNvSpPr/>
           <p:nvPr/>
         </p:nvSpPr>
@@ -10385,7 +10379,7 @@
       </p:sp>
       <p:graphicFrame>
         <p:nvGraphicFramePr>
-          <p:cNvPr id="172" name="Table 4"/>
+          <p:cNvPr id="165" name="Table 4"/>
           <p:cNvGraphicFramePr/>
           <p:nvPr/>
         </p:nvGraphicFramePr>
@@ -10471,7 +10465,7 @@
                           <a:latin typeface="Apple Symbols"/>
                           <a:ea typeface="Apple Symbols"/>
                         </a:rPr>
-                        <a:t>$18,244,800</a:t>
+                        <a:t>16,000,000 €</a:t>
                       </a:r>
                       <a:endParaRPr b="0" lang="en-CA" sz="1800" strike="noStrike" u="none">
                         <a:solidFill>
@@ -10571,7 +10565,7 @@
                           <a:latin typeface="Apple Symbols"/>
                           <a:ea typeface="Apple Symbols"/>
                         </a:rPr>
-                        <a:t>$3,762,991</a:t>
+                        <a:t>3,300,001 €</a:t>
                       </a:r>
                       <a:endParaRPr b="0" lang="en-CA" sz="1800" strike="noStrike" u="none">
                         <a:solidFill>
@@ -10671,7 +10665,7 @@
                           <a:latin typeface="Apple Symbols"/>
                           <a:ea typeface="Apple Symbols"/>
                         </a:rPr>
-                        <a:t>$63,729</a:t>
+                        <a:t>55,888 €</a:t>
                       </a:r>
                       <a:endParaRPr b="0" lang="en-CA" sz="1800" strike="noStrike" u="none">
                         <a:solidFill>
@@ -10771,7 +10765,7 @@
                           <a:latin typeface="Apple Symbols"/>
                           <a:ea typeface="Apple Symbols"/>
                         </a:rPr>
-                        <a:t>$8,043,715</a:t>
+                        <a:t>7,054,034 €</a:t>
                       </a:r>
                       <a:endParaRPr b="0" lang="en-CA" sz="1800" strike="noStrike" u="none">
                         <a:solidFill>
@@ -10871,7 +10865,7 @@
                           <a:latin typeface="Apple Symbols"/>
                           <a:ea typeface="Apple Symbols"/>
                         </a:rPr>
-                        <a:t>$2,280,600</a:t>
+                        <a:t>2,000,000 €</a:t>
                       </a:r>
                       <a:endParaRPr b="0" lang="en-CA" sz="1800" strike="noStrike" u="none">
                         <a:solidFill>
@@ -10905,55 +10899,6 @@
           </a:graphicData>
         </a:graphic>
       </p:graphicFrame>
-      <p:sp>
-        <p:nvSpPr>
-          <p:cNvPr id="173" name="TextBox 6"/>
-          <p:cNvSpPr txBox="1"/>
-          <p:nvPr/>
-        </p:nvSpPr>
-        <p:spPr>
-          <a:xfrm>
-            <a:off x="6379560" y="1140480"/>
-            <a:ext cx="3517200" cy="914760"/>
-          </a:xfrm>
-          <a:prstGeom prst="rect">
-            <a:avLst/>
-          </a:prstGeom>
-          <a:noFill/>
-          <a:ln w="0">
-            <a:noFill/>
-          </a:ln>
-        </p:spPr>
-        <p:txBody>
-          <a:bodyPr anchor="t">
-            <a:noAutofit/>
-          </a:bodyPr>
-          <a:p>
-            <a:pPr>
-              <a:lnSpc>
-                <a:spcPct val="100000"/>
-              </a:lnSpc>
-            </a:pPr>
-            <a:r>
-              <a:rPr b="0" lang="en-US" sz="1800" strike="noStrike" u="none">
-                <a:solidFill>
-                  <a:srgbClr val="000000"/>
-                </a:solidFill>
-                <a:uFillTx/>
-                <a:latin typeface="Aptos"/>
-              </a:rPr>
-              <a:t>https://storage.googleapis.com/freshtracks_public/other/StealthCo-1727718321686.png</a:t>
-            </a:r>
-            <a:endParaRPr b="0" lang="en-CA" sz="1800" strike="noStrike" u="none">
-              <a:solidFill>
-                <a:srgbClr val="000000"/>
-              </a:solidFill>
-              <a:uFillTx/>
-              <a:latin typeface="Arial"/>
-            </a:endParaRPr>
-          </a:p>
-        </p:txBody>
-      </p:sp>
     </p:spTree>
   </p:cSld>
   <mc:AlternateContent>
@@ -11162,7 +11107,7 @@
                           <a:latin typeface="Arial"/>
                           <a:ea typeface="PingFang SC"/>
                         </a:rPr>
-                        <a:t>$18,244,800</a:t>
+                        <a:t>16,000,000 €</a:t>
                       </a:r>
                       <a:endParaRPr b="0" lang="en-CA" sz="1100" strike="noStrike" u="none">
                         <a:solidFill>
@@ -11268,7 +11213,7 @@
                           <a:latin typeface="Arial"/>
                           <a:ea typeface="PingFang SC"/>
                         </a:rPr>
-                        <a:t>$3,762,991</a:t>
+                        <a:t>3,300,001 €</a:t>
                       </a:r>
                       <a:endParaRPr b="0" lang="en-CA" sz="1100" strike="noStrike" u="none">
                         <a:solidFill>
@@ -11374,7 +11319,7 @@
                           <a:latin typeface="Arial"/>
                           <a:ea typeface="PingFang SC"/>
                         </a:rPr>
-                        <a:t>$63,729</a:t>
+                        <a:t>55,888 €</a:t>
                       </a:r>
                       <a:endParaRPr b="0" lang="en-CA" sz="1100" strike="noStrike" u="none">
                         <a:solidFill>
@@ -11480,7 +11425,7 @@
                           <a:latin typeface="Arial"/>
                           <a:ea typeface="PingFang SC"/>
                         </a:rPr>
-                        <a:t>$8,043,715</a:t>
+                        <a:t>7,054,034 €</a:t>
                       </a:r>
                       <a:endParaRPr b="0" lang="en-CA" sz="1100" strike="noStrike" u="none">
                         <a:solidFill>
@@ -11586,7 +11531,7 @@
                           <a:latin typeface="Arial"/>
                           <a:ea typeface="PingFang SC"/>
                         </a:rPr>
-                        <a:t>$2,280,600</a:t>
+                        <a:t>2,000,000 €</a:t>
                       </a:r>
                       <a:endParaRPr b="0" lang="en-CA" sz="1100" strike="noStrike" u="none">
                         <a:solidFill>
@@ -12299,13 +12244,7 @@
           <p:nvPr/>
         </p:nvPicPr>
         <p:blipFill>
-          <a:blip r:embed="rId1">
-            <a:extLst>
-              <a:ext uri="{96DAC541-7B7A-43D3-8B79-37D633B846F1}">
-                <asvg:svgBlip xmlns:asvg="http://schemas.microsoft.com/office/drawing/2016/SVG/main" r:embed="rId2"/>
-              </a:ext>
-            </a:extLst>
-          </a:blip>
+          <a:blip r:embed="rId1"/>
           <a:stretch/>
         </p:blipFill>
         <p:spPr>
@@ -12469,7 +12408,7 @@
                           <a:latin typeface="Apple Symbols"/>
                           <a:ea typeface="Apple Symbols"/>
                         </a:rPr>
-                        <a:t>$18,244,800</a:t>
+                        <a:t>16,000,000 €</a:t>
                       </a:r>
                       <a:endParaRPr b="0" lang="en-CA" sz="1800" strike="noStrike" u="none">
                         <a:solidFill>
@@ -12569,7 +12508,7 @@
                           <a:latin typeface="Apple Symbols"/>
                           <a:ea typeface="Apple Symbols"/>
                         </a:rPr>
-                        <a:t>$3,762,991</a:t>
+                        <a:t>3,300,001 €</a:t>
                       </a:r>
                       <a:endParaRPr b="0" lang="en-CA" sz="1800" strike="noStrike" u="none">
                         <a:solidFill>
@@ -12669,7 +12608,7 @@
                           <a:latin typeface="Apple Symbols"/>
                           <a:ea typeface="Apple Symbols"/>
                         </a:rPr>
-                        <a:t>$63,729</a:t>
+                        <a:t>55,888 €</a:t>
                       </a:r>
                       <a:endParaRPr b="0" lang="en-CA" sz="1800" strike="noStrike" u="none">
                         <a:solidFill>
@@ -12769,7 +12708,7 @@
                           <a:latin typeface="Apple Symbols"/>
                           <a:ea typeface="Apple Symbols"/>
                         </a:rPr>
-                        <a:t>$8,043,715</a:t>
+                        <a:t>7,054,034 €</a:t>
                       </a:r>
                       <a:endParaRPr b="0" lang="en-CA" sz="1800" strike="noStrike" u="none">
                         <a:solidFill>
@@ -12869,7 +12808,7 @@
                           <a:latin typeface="Apple Symbols"/>
                           <a:ea typeface="Apple Symbols"/>
                         </a:rPr>
-                        <a:t>$2,280,600</a:t>
+                        <a:t>2,000,000 €</a:t>
                       </a:r>
                       <a:endParaRPr b="0" lang="en-CA" sz="1800" strike="noStrike" u="none">
                         <a:solidFill>
@@ -12903,55 +12842,6 @@
           </a:graphicData>
         </a:graphic>
       </p:graphicFrame>
-      <p:sp>
-        <p:nvSpPr>
-          <p:cNvPr id="138" name="TextBox 6"/>
-          <p:cNvSpPr txBox="1"/>
-          <p:nvPr/>
-        </p:nvSpPr>
-        <p:spPr>
-          <a:xfrm>
-            <a:off x="6379560" y="1140480"/>
-            <a:ext cx="3517200" cy="914760"/>
-          </a:xfrm>
-          <a:prstGeom prst="rect">
-            <a:avLst/>
-          </a:prstGeom>
-          <a:noFill/>
-          <a:ln w="0">
-            <a:noFill/>
-          </a:ln>
-        </p:spPr>
-        <p:txBody>
-          <a:bodyPr anchor="t">
-            <a:noAutofit/>
-          </a:bodyPr>
-          <a:p>
-            <a:pPr>
-              <a:lnSpc>
-                <a:spcPct val="100000"/>
-              </a:lnSpc>
-            </a:pPr>
-            <a:r>
-              <a:rPr b="0" lang="en-US" sz="1800" strike="noStrike" u="none">
-                <a:solidFill>
-                  <a:srgbClr val="000000"/>
-                </a:solidFill>
-                <a:uFillTx/>
-                <a:latin typeface="Aptos"/>
-              </a:rPr>
-              <a:t>https://storage.googleapis.com/freshtracks_public/other/AICo-1727718322184.png</a:t>
-            </a:r>
-            <a:endParaRPr b="0" lang="en-CA" sz="1800" strike="noStrike" u="none">
-              <a:solidFill>
-                <a:srgbClr val="000000"/>
-              </a:solidFill>
-              <a:uFillTx/>
-              <a:latin typeface="Arial"/>
-            </a:endParaRPr>
-          </a:p>
-        </p:txBody>
-      </p:sp>
     </p:spTree>
   </p:cSld>
   <mc:AlternateContent>
@@ -12991,7 +12881,7 @@
       </p:grpSpPr>
       <p:sp>
         <p:nvSpPr>
-          <p:cNvPr id="139" name="PlaceHolder 1"/>
+          <p:cNvPr id="138" name="PlaceHolder 1"/>
           <p:cNvSpPr>
             <a:spLocks noGrp="1"/>
           </p:cNvSpPr>
@@ -13052,7 +12942,7 @@
       </p:sp>
       <p:pic>
         <p:nvPicPr>
-          <p:cNvPr id="140" name="Graphic 1" descr=""/>
+          <p:cNvPr id="139" name="Graphic 1" descr=""/>
           <p:cNvPicPr/>
           <p:nvPr/>
         </p:nvPicPr>
@@ -13081,7 +12971,7 @@
       </p:pic>
       <p:sp>
         <p:nvSpPr>
-          <p:cNvPr id="141" name="Rectangle 3"/>
+          <p:cNvPr id="140" name="Rectangle 3"/>
           <p:cNvSpPr/>
           <p:nvPr/>
         </p:nvSpPr>
@@ -13141,7 +13031,7 @@
       </p:sp>
       <p:graphicFrame>
         <p:nvGraphicFramePr>
-          <p:cNvPr id="142" name="Table 4"/>
+          <p:cNvPr id="141" name="Table 4"/>
           <p:cNvGraphicFramePr/>
           <p:nvPr/>
         </p:nvGraphicFramePr>
@@ -13227,7 +13117,7 @@
                           <a:latin typeface="Apple Symbols"/>
                           <a:ea typeface="Apple Symbols"/>
                         </a:rPr>
-                        <a:t>$18,244,800</a:t>
+                        <a:t>16,000,000 €</a:t>
                       </a:r>
                       <a:endParaRPr b="0" lang="en-CA" sz="1800" strike="noStrike" u="none">
                         <a:solidFill>
@@ -13327,7 +13217,7 @@
                           <a:latin typeface="Apple Symbols"/>
                           <a:ea typeface="Apple Symbols"/>
                         </a:rPr>
-                        <a:t>$3,762,991</a:t>
+                        <a:t>3,300,001 €</a:t>
                       </a:r>
                       <a:endParaRPr b="0" lang="en-CA" sz="1800" strike="noStrike" u="none">
                         <a:solidFill>
@@ -13427,7 +13317,7 @@
                           <a:latin typeface="Apple Symbols"/>
                           <a:ea typeface="Apple Symbols"/>
                         </a:rPr>
-                        <a:t>$63,729</a:t>
+                        <a:t>55,888 €</a:t>
                       </a:r>
                       <a:endParaRPr b="0" lang="en-CA" sz="1800" strike="noStrike" u="none">
                         <a:solidFill>
@@ -13527,7 +13417,7 @@
                           <a:latin typeface="Apple Symbols"/>
                           <a:ea typeface="Apple Symbols"/>
                         </a:rPr>
-                        <a:t>$8,043,715</a:t>
+                        <a:t>7,054,034 €</a:t>
                       </a:r>
                       <a:endParaRPr b="0" lang="en-CA" sz="1800" strike="noStrike" u="none">
                         <a:solidFill>
@@ -13627,7 +13517,7 @@
                           <a:latin typeface="Apple Symbols"/>
                           <a:ea typeface="Apple Symbols"/>
                         </a:rPr>
-                        <a:t>$2,280,600</a:t>
+                        <a:t>2,000,000 €</a:t>
                       </a:r>
                       <a:endParaRPr b="0" lang="en-CA" sz="1800" strike="noStrike" u="none">
                         <a:solidFill>
@@ -13661,40 +13551,6 @@
           </a:graphicData>
         </a:graphic>
       </p:graphicFrame>
-      <p:sp>
-        <p:nvSpPr>
-          <p:cNvPr id="143" name="TextBox 6"/>
-          <p:cNvSpPr txBox="1"/>
-          <p:nvPr/>
-        </p:nvSpPr>
-        <p:spPr>
-          <a:xfrm>
-            <a:off x="6379560" y="1140480"/>
-            <a:ext cx="3517200" cy="428760"/>
-          </a:xfrm>
-          <a:prstGeom prst="rect">
-            <a:avLst/>
-          </a:prstGeom>
-          <a:noFill/>
-          <a:ln w="0">
-            <a:noFill/>
-          </a:ln>
-        </p:spPr>
-        <p:txBody>
-          <a:bodyPr anchor="t">
-            <a:noAutofit/>
-          </a:bodyPr>
-          <a:p>
-            <a:endParaRPr b="0" lang="en-CA" sz="1800" strike="noStrike" u="none">
-              <a:solidFill>
-                <a:srgbClr val="000000"/>
-              </a:solidFill>
-              <a:uFillTx/>
-              <a:latin typeface="Arial"/>
-            </a:endParaRPr>
-          </a:p>
-        </p:txBody>
-      </p:sp>
     </p:spTree>
   </p:cSld>
   <mc:AlternateContent>
@@ -13734,7 +13590,7 @@
       </p:grpSpPr>
       <p:sp>
         <p:nvSpPr>
-          <p:cNvPr id="144" name="PlaceHolder 1"/>
+          <p:cNvPr id="142" name="PlaceHolder 1"/>
           <p:cNvSpPr>
             <a:spLocks noGrp="1"/>
           </p:cNvSpPr>
@@ -13795,7 +13651,7 @@
       </p:sp>
       <p:pic>
         <p:nvPicPr>
-          <p:cNvPr id="145" name="Graphic 1" descr=""/>
+          <p:cNvPr id="143" name="Graphic 1" descr=""/>
           <p:cNvPicPr/>
           <p:nvPr/>
         </p:nvPicPr>
@@ -13824,7 +13680,7 @@
       </p:pic>
       <p:sp>
         <p:nvSpPr>
-          <p:cNvPr id="146" name="Rectangle 3"/>
+          <p:cNvPr id="144" name="Rectangle 3"/>
           <p:cNvSpPr/>
           <p:nvPr/>
         </p:nvSpPr>
@@ -13884,7 +13740,7 @@
       </p:sp>
       <p:graphicFrame>
         <p:nvGraphicFramePr>
-          <p:cNvPr id="147" name="Table 4"/>
+          <p:cNvPr id="145" name="Table 4"/>
           <p:cNvGraphicFramePr/>
           <p:nvPr/>
         </p:nvGraphicFramePr>
@@ -13970,7 +13826,7 @@
                           <a:latin typeface="Apple Symbols"/>
                           <a:ea typeface="Apple Symbols"/>
                         </a:rPr>
-                        <a:t>$18,244,800</a:t>
+                        <a:t>16,000,000 €</a:t>
                       </a:r>
                       <a:endParaRPr b="0" lang="en-CA" sz="1800" strike="noStrike" u="none">
                         <a:solidFill>
@@ -14070,7 +13926,7 @@
                           <a:latin typeface="Apple Symbols"/>
                           <a:ea typeface="Apple Symbols"/>
                         </a:rPr>
-                        <a:t>$3,762,991</a:t>
+                        <a:t>3,300,001 €</a:t>
                       </a:r>
                       <a:endParaRPr b="0" lang="en-CA" sz="1800" strike="noStrike" u="none">
                         <a:solidFill>
@@ -14170,7 +14026,7 @@
                           <a:latin typeface="Apple Symbols"/>
                           <a:ea typeface="Apple Symbols"/>
                         </a:rPr>
-                        <a:t>$63,729</a:t>
+                        <a:t>55,888 €</a:t>
                       </a:r>
                       <a:endParaRPr b="0" lang="en-CA" sz="1800" strike="noStrike" u="none">
                         <a:solidFill>
@@ -14270,7 +14126,7 @@
                           <a:latin typeface="Apple Symbols"/>
                           <a:ea typeface="Apple Symbols"/>
                         </a:rPr>
-                        <a:t>$8,043,715</a:t>
+                        <a:t>7,054,034 €</a:t>
                       </a:r>
                       <a:endParaRPr b="0" lang="en-CA" sz="1800" strike="noStrike" u="none">
                         <a:solidFill>
@@ -14370,7 +14226,7 @@
                           <a:latin typeface="Apple Symbols"/>
                           <a:ea typeface="Apple Symbols"/>
                         </a:rPr>
-                        <a:t>$2,280,600</a:t>
+                        <a:t>2,000,000 €</a:t>
                       </a:r>
                       <a:endParaRPr b="0" lang="en-CA" sz="1800" strike="noStrike" u="none">
                         <a:solidFill>
@@ -14404,40 +14260,6 @@
           </a:graphicData>
         </a:graphic>
       </p:graphicFrame>
-      <p:sp>
-        <p:nvSpPr>
-          <p:cNvPr id="148" name="TextBox 6"/>
-          <p:cNvSpPr txBox="1"/>
-          <p:nvPr/>
-        </p:nvSpPr>
-        <p:spPr>
-          <a:xfrm>
-            <a:off x="6379560" y="1140480"/>
-            <a:ext cx="3517200" cy="428760"/>
-          </a:xfrm>
-          <a:prstGeom prst="rect">
-            <a:avLst/>
-          </a:prstGeom>
-          <a:noFill/>
-          <a:ln w="0">
-            <a:noFill/>
-          </a:ln>
-        </p:spPr>
-        <p:txBody>
-          <a:bodyPr anchor="t">
-            <a:noAutofit/>
-          </a:bodyPr>
-          <a:p>
-            <a:endParaRPr b="0" lang="en-CA" sz="1800" strike="noStrike" u="none">
-              <a:solidFill>
-                <a:srgbClr val="000000"/>
-              </a:solidFill>
-              <a:uFillTx/>
-              <a:latin typeface="Arial"/>
-            </a:endParaRPr>
-          </a:p>
-        </p:txBody>
-      </p:sp>
     </p:spTree>
   </p:cSld>
   <mc:AlternateContent>
@@ -14477,7 +14299,7 @@
       </p:grpSpPr>
       <p:sp>
         <p:nvSpPr>
-          <p:cNvPr id="149" name="PlaceHolder 1"/>
+          <p:cNvPr id="146" name="PlaceHolder 1"/>
           <p:cNvSpPr>
             <a:spLocks noGrp="1"/>
           </p:cNvSpPr>
@@ -14538,7 +14360,7 @@
       </p:sp>
       <p:pic>
         <p:nvPicPr>
-          <p:cNvPr id="150" name="Graphic 1" descr=""/>
+          <p:cNvPr id="147" name="Graphic 1" descr=""/>
           <p:cNvPicPr/>
           <p:nvPr/>
         </p:nvPicPr>
@@ -14567,7 +14389,7 @@
       </p:pic>
       <p:sp>
         <p:nvSpPr>
-          <p:cNvPr id="151" name="Rectangle 3"/>
+          <p:cNvPr id="148" name="Rectangle 3"/>
           <p:cNvSpPr/>
           <p:nvPr/>
         </p:nvSpPr>
@@ -14627,7 +14449,7 @@
       </p:sp>
       <p:graphicFrame>
         <p:nvGraphicFramePr>
-          <p:cNvPr id="152" name="Table 4"/>
+          <p:cNvPr id="149" name="Table 4"/>
           <p:cNvGraphicFramePr/>
           <p:nvPr/>
         </p:nvGraphicFramePr>
@@ -14713,7 +14535,7 @@
                           <a:latin typeface="Apple Symbols"/>
                           <a:ea typeface="Apple Symbols"/>
                         </a:rPr>
-                        <a:t>$18,244,800</a:t>
+                        <a:t>16,000,000 €</a:t>
                       </a:r>
                       <a:endParaRPr b="0" lang="en-CA" sz="1800" strike="noStrike" u="none">
                         <a:solidFill>
@@ -14813,7 +14635,7 @@
                           <a:latin typeface="Apple Symbols"/>
                           <a:ea typeface="Apple Symbols"/>
                         </a:rPr>
-                        <a:t>$3,762,991</a:t>
+                        <a:t>3,300,001 €</a:t>
                       </a:r>
                       <a:endParaRPr b="0" lang="en-CA" sz="1800" strike="noStrike" u="none">
                         <a:solidFill>
@@ -14913,7 +14735,7 @@
                           <a:latin typeface="Apple Symbols"/>
                           <a:ea typeface="Apple Symbols"/>
                         </a:rPr>
-                        <a:t>$63,729</a:t>
+                        <a:t>55,888 €</a:t>
                       </a:r>
                       <a:endParaRPr b="0" lang="en-CA" sz="1800" strike="noStrike" u="none">
                         <a:solidFill>
@@ -15013,7 +14835,7 @@
                           <a:latin typeface="Apple Symbols"/>
                           <a:ea typeface="Apple Symbols"/>
                         </a:rPr>
-                        <a:t>$8,043,715</a:t>
+                        <a:t>7,054,034 €</a:t>
                       </a:r>
                       <a:endParaRPr b="0" lang="en-CA" sz="1800" strike="noStrike" u="none">
                         <a:solidFill>
@@ -15113,7 +14935,7 @@
                           <a:latin typeface="Apple Symbols"/>
                           <a:ea typeface="Apple Symbols"/>
                         </a:rPr>
-                        <a:t>$2,280,600</a:t>
+                        <a:t>2,000,000 €</a:t>
                       </a:r>
                       <a:endParaRPr b="0" lang="en-CA" sz="1800" strike="noStrike" u="none">
                         <a:solidFill>
@@ -15147,40 +14969,6 @@
           </a:graphicData>
         </a:graphic>
       </p:graphicFrame>
-      <p:sp>
-        <p:nvSpPr>
-          <p:cNvPr id="153" name="TextBox 6"/>
-          <p:cNvSpPr txBox="1"/>
-          <p:nvPr/>
-        </p:nvSpPr>
-        <p:spPr>
-          <a:xfrm>
-            <a:off x="6379560" y="1140480"/>
-            <a:ext cx="3517200" cy="428760"/>
-          </a:xfrm>
-          <a:prstGeom prst="rect">
-            <a:avLst/>
-          </a:prstGeom>
-          <a:noFill/>
-          <a:ln w="0">
-            <a:noFill/>
-          </a:ln>
-        </p:spPr>
-        <p:txBody>
-          <a:bodyPr anchor="t">
-            <a:noAutofit/>
-          </a:bodyPr>
-          <a:p>
-            <a:endParaRPr b="0" lang="en-CA" sz="1800" strike="noStrike" u="none">
-              <a:solidFill>
-                <a:srgbClr val="000000"/>
-              </a:solidFill>
-              <a:uFillTx/>
-              <a:latin typeface="Arial"/>
-            </a:endParaRPr>
-          </a:p>
-        </p:txBody>
-      </p:sp>
     </p:spTree>
   </p:cSld>
   <mc:AlternateContent>
@@ -15220,7 +15008,7 @@
       </p:grpSpPr>
       <p:sp>
         <p:nvSpPr>
-          <p:cNvPr id="154" name="PlaceHolder 1"/>
+          <p:cNvPr id="150" name="PlaceHolder 1"/>
           <p:cNvSpPr>
             <a:spLocks noGrp="1"/>
           </p:cNvSpPr>
@@ -15303,18 +15091,726 @@
       </p:sp>
       <p:pic>
         <p:nvPicPr>
+          <p:cNvPr id="151" name="Graphic 1" descr=""/>
+          <p:cNvPicPr/>
+          <p:nvPr/>
+        </p:nvPicPr>
+        <p:blipFill>
+          <a:blip r:embed="rId1"/>
+          <a:stretch/>
+        </p:blipFill>
+        <p:spPr>
+          <a:xfrm>
+            <a:off x="8982360" y="226080"/>
+            <a:ext cx="914400" cy="914400"/>
+          </a:xfrm>
+          <a:prstGeom prst="rect">
+            <a:avLst/>
+          </a:prstGeom>
+          <a:ln w="19080">
+            <a:noFill/>
+          </a:ln>
+        </p:spPr>
+      </p:pic>
+      <p:sp>
+        <p:nvSpPr>
+          <p:cNvPr id="152" name="Rectangle 3"/>
+          <p:cNvSpPr/>
+          <p:nvPr/>
+        </p:nvSpPr>
+        <p:spPr>
+          <a:xfrm>
+            <a:off x="1890720" y="2833560"/>
+            <a:ext cx="10080720" cy="457200"/>
+          </a:xfrm>
+          <a:custGeom>
+            <a:avLst/>
+            <a:gdLst/>
+            <a:ahLst/>
+            <a:rect l="l" t="t" r="r" b="b"/>
+            <a:pathLst>
+              <a:path w="21600" h="21600">
+                <a:moveTo>
+                  <a:pt x="0" y="0"/>
+                </a:moveTo>
+                <a:lnTo>
+                  <a:pt x="21600" y="0"/>
+                </a:lnTo>
+                <a:lnTo>
+                  <a:pt x="21600" y="21600"/>
+                </a:lnTo>
+                <a:lnTo>
+                  <a:pt x="0" y="21600"/>
+                </a:lnTo>
+                <a:close/>
+              </a:path>
+            </a:pathLst>
+          </a:custGeom>
+          <a:noFill/>
+          <a:ln w="0">
+            <a:noFill/>
+          </a:ln>
+        </p:spPr>
+        <p:style>
+          <a:lnRef idx="0"/>
+          <a:fillRef idx="0"/>
+          <a:effectRef idx="0"/>
+          <a:fontRef idx="minor"/>
+        </p:style>
+        <p:txBody>
+          <a:bodyPr wrap="none" anchor="ctr">
+            <a:spAutoFit/>
+          </a:bodyPr>
+          <a:p>
+            <a:endParaRPr b="0" lang="en-CA" sz="1800" strike="noStrike" u="none">
+              <a:solidFill>
+                <a:srgbClr val="000000"/>
+              </a:solidFill>
+              <a:uFillTx/>
+              <a:latin typeface="Arial"/>
+            </a:endParaRPr>
+          </a:p>
+        </p:txBody>
+      </p:sp>
+      <p:graphicFrame>
+        <p:nvGraphicFramePr>
+          <p:cNvPr id="153" name="Table 4"/>
+          <p:cNvGraphicFramePr/>
+          <p:nvPr/>
+        </p:nvGraphicFramePr>
+        <p:xfrm>
+          <a:off x="463680" y="1655640"/>
+          <a:ext cx="6413760" cy="3680280"/>
+        </p:xfrm>
+        <a:graphic>
+          <a:graphicData uri="http://schemas.openxmlformats.org/drawingml/2006/table">
+            <a:tbl>
+              <a:tblPr/>
+              <a:tblGrid>
+                <a:gridCol w="1382400"/>
+                <a:gridCol w="5031360"/>
+              </a:tblGrid>
+              <a:tr h="780120">
+                <a:tc>
+                  <a:txBody>
+                    <a:bodyPr anchor="t">
+                      <a:noAutofit/>
+                    </a:bodyPr>
+                    <a:p>
+                      <a:pPr algn="r">
+                        <a:lnSpc>
+                          <a:spcPct val="120000"/>
+                        </a:lnSpc>
+                      </a:pPr>
+                      <a:r>
+                        <a:rPr b="0" lang="en-CA" sz="1800" strike="noStrike" u="none">
+                          <a:solidFill>
+                            <a:srgbClr val="666666"/>
+                          </a:solidFill>
+                          <a:uFillTx/>
+                          <a:latin typeface="Apple Symbols"/>
+                          <a:ea typeface="PingFang SC"/>
+                        </a:rPr>
+                        <a:t>Committed Capital:</a:t>
+                      </a:r>
+                      <a:endParaRPr b="0" lang="en-CA" sz="1800" strike="noStrike" u="none">
+                        <a:solidFill>
+                          <a:srgbClr val="ffffff"/>
+                        </a:solidFill>
+                        <a:uFillTx/>
+                        <a:latin typeface="Times New Roman"/>
+                      </a:endParaRPr>
+                    </a:p>
+                  </a:txBody>
+                  <a:tcPr anchor="t" marL="91440" marR="91440">
+                    <a:lnL>
+                      <a:noFill/>
+                    </a:lnL>
+                    <a:lnR>
+                      <a:noFill/>
+                    </a:lnR>
+                    <a:lnT>
+                      <a:noFill/>
+                    </a:lnT>
+                    <a:lnB>
+                      <a:noFill/>
+                    </a:lnB>
+                    <a:solidFill>
+                      <a:srgbClr val="156082"/>
+                    </a:solidFill>
+                  </a:tcPr>
+                </a:tc>
+                <a:tc>
+                  <a:txBody>
+                    <a:bodyPr anchor="t">
+                      <a:noAutofit/>
+                    </a:bodyPr>
+                    <a:p>
+                      <a:pPr algn="r">
+                        <a:lnSpc>
+                          <a:spcPct val="120000"/>
+                        </a:lnSpc>
+                      </a:pPr>
+                      <a:r>
+                        <a:rPr b="0" lang="en-CA" sz="1800" strike="noStrike" u="none">
+                          <a:solidFill>
+                            <a:srgbClr val="0084d1"/>
+                          </a:solidFill>
+                          <a:uFillTx/>
+                          <a:latin typeface="Apple Symbols"/>
+                          <a:ea typeface="Apple Symbols"/>
+                        </a:rPr>
+                        <a:t>16,000,000 €</a:t>
+                      </a:r>
+                      <a:endParaRPr b="0" lang="en-CA" sz="1800" strike="noStrike" u="none">
+                        <a:solidFill>
+                          <a:srgbClr val="ffffff"/>
+                        </a:solidFill>
+                        <a:uFillTx/>
+                        <a:latin typeface="Times New Roman"/>
+                      </a:endParaRPr>
+                    </a:p>
+                  </a:txBody>
+                  <a:tcPr anchor="t" marL="91440" marR="91440">
+                    <a:lnL>
+                      <a:noFill/>
+                    </a:lnL>
+                    <a:lnR>
+                      <a:noFill/>
+                    </a:lnR>
+                    <a:lnT>
+                      <a:noFill/>
+                    </a:lnT>
+                    <a:lnB>
+                      <a:noFill/>
+                    </a:lnB>
+                    <a:solidFill>
+                      <a:srgbClr val="156082"/>
+                    </a:solidFill>
+                  </a:tcPr>
+                </a:tc>
+              </a:tr>
+              <a:tr h="558360">
+                <a:tc>
+                  <a:txBody>
+                    <a:bodyPr anchor="t">
+                      <a:noAutofit/>
+                    </a:bodyPr>
+                    <a:p>
+                      <a:pPr algn="r">
+                        <a:lnSpc>
+                          <a:spcPct val="120000"/>
+                        </a:lnSpc>
+                      </a:pPr>
+                      <a:r>
+                        <a:rPr b="0" lang="en-CA" sz="1800" strike="noStrike" u="none">
+                          <a:solidFill>
+                            <a:srgbClr val="666666"/>
+                          </a:solidFill>
+                          <a:uFillTx/>
+                          <a:latin typeface="Apple Symbols"/>
+                          <a:ea typeface="PingFang SC"/>
+                        </a:rPr>
+                        <a:t>Total Invested:</a:t>
+                      </a:r>
+                      <a:endParaRPr b="0" lang="en-CA" sz="1800" strike="noStrike" u="none">
+                        <a:solidFill>
+                          <a:srgbClr val="ffffff"/>
+                        </a:solidFill>
+                        <a:uFillTx/>
+                        <a:latin typeface="Times New Roman"/>
+                      </a:endParaRPr>
+                    </a:p>
+                  </a:txBody>
+                  <a:tcPr anchor="t" marL="91440" marR="91440">
+                    <a:lnL>
+                      <a:noFill/>
+                    </a:lnL>
+                    <a:lnR>
+                      <a:noFill/>
+                    </a:lnR>
+                    <a:lnT>
+                      <a:noFill/>
+                    </a:lnT>
+                    <a:lnB>
+                      <a:noFill/>
+                    </a:lnB>
+                    <a:solidFill>
+                      <a:srgbClr val="156082"/>
+                    </a:solidFill>
+                  </a:tcPr>
+                </a:tc>
+                <a:tc>
+                  <a:txBody>
+                    <a:bodyPr anchor="t">
+                      <a:noAutofit/>
+                    </a:bodyPr>
+                    <a:p>
+                      <a:pPr algn="r">
+                        <a:lnSpc>
+                          <a:spcPct val="120000"/>
+                        </a:lnSpc>
+                      </a:pPr>
+                      <a:r>
+                        <a:rPr b="0" lang="en-CA" sz="1800" strike="noStrike" u="none">
+                          <a:solidFill>
+                            <a:srgbClr val="0084d1"/>
+                          </a:solidFill>
+                          <a:uFillTx/>
+                          <a:latin typeface="Apple Symbols"/>
+                          <a:ea typeface="Apple Symbols"/>
+                        </a:rPr>
+                        <a:t>3,300,001 €</a:t>
+                      </a:r>
+                      <a:endParaRPr b="0" lang="en-CA" sz="1800" strike="noStrike" u="none">
+                        <a:solidFill>
+                          <a:srgbClr val="ffffff"/>
+                        </a:solidFill>
+                        <a:uFillTx/>
+                        <a:latin typeface="Times New Roman"/>
+                      </a:endParaRPr>
+                    </a:p>
+                  </a:txBody>
+                  <a:tcPr anchor="t" marL="91440" marR="91440">
+                    <a:lnL>
+                      <a:noFill/>
+                    </a:lnL>
+                    <a:lnR>
+                      <a:noFill/>
+                    </a:lnR>
+                    <a:lnT>
+                      <a:noFill/>
+                    </a:lnT>
+                    <a:lnB>
+                      <a:noFill/>
+                    </a:lnB>
+                    <a:solidFill>
+                      <a:srgbClr val="156082"/>
+                    </a:solidFill>
+                  </a:tcPr>
+                </a:tc>
+              </a:tr>
+              <a:tr h="780120">
+                <a:tc>
+                  <a:txBody>
+                    <a:bodyPr anchor="t">
+                      <a:noAutofit/>
+                    </a:bodyPr>
+                    <a:p>
+                      <a:pPr algn="r">
+                        <a:lnSpc>
+                          <a:spcPct val="120000"/>
+                        </a:lnSpc>
+                      </a:pPr>
+                      <a:r>
+                        <a:rPr b="0" lang="en-CA" sz="1800" strike="noStrike" u="none">
+                          <a:solidFill>
+                            <a:srgbClr val="666666"/>
+                          </a:solidFill>
+                          <a:uFillTx/>
+                          <a:latin typeface="Apple Symbols"/>
+                          <a:ea typeface="PingFang SC"/>
+                        </a:rPr>
+                        <a:t>Total Distributed:</a:t>
+                      </a:r>
+                      <a:endParaRPr b="0" lang="en-CA" sz="1800" strike="noStrike" u="none">
+                        <a:solidFill>
+                          <a:srgbClr val="ffffff"/>
+                        </a:solidFill>
+                        <a:uFillTx/>
+                        <a:latin typeface="Times New Roman"/>
+                      </a:endParaRPr>
+                    </a:p>
+                  </a:txBody>
+                  <a:tcPr anchor="t" marL="91440" marR="91440">
+                    <a:lnL>
+                      <a:noFill/>
+                    </a:lnL>
+                    <a:lnR>
+                      <a:noFill/>
+                    </a:lnR>
+                    <a:lnT>
+                      <a:noFill/>
+                    </a:lnT>
+                    <a:lnB>
+                      <a:noFill/>
+                    </a:lnB>
+                    <a:solidFill>
+                      <a:srgbClr val="156082"/>
+                    </a:solidFill>
+                  </a:tcPr>
+                </a:tc>
+                <a:tc>
+                  <a:txBody>
+                    <a:bodyPr anchor="t">
+                      <a:noAutofit/>
+                    </a:bodyPr>
+                    <a:p>
+                      <a:pPr algn="r">
+                        <a:lnSpc>
+                          <a:spcPct val="120000"/>
+                        </a:lnSpc>
+                      </a:pPr>
+                      <a:r>
+                        <a:rPr b="0" lang="en-CA" sz="1800" strike="noStrike" u="none">
+                          <a:solidFill>
+                            <a:srgbClr val="0084d1"/>
+                          </a:solidFill>
+                          <a:uFillTx/>
+                          <a:latin typeface="Apple Symbols"/>
+                          <a:ea typeface="Apple Symbols"/>
+                        </a:rPr>
+                        <a:t>55,888 €</a:t>
+                      </a:r>
+                      <a:endParaRPr b="0" lang="en-CA" sz="1800" strike="noStrike" u="none">
+                        <a:solidFill>
+                          <a:srgbClr val="ffffff"/>
+                        </a:solidFill>
+                        <a:uFillTx/>
+                        <a:latin typeface="Times New Roman"/>
+                      </a:endParaRPr>
+                    </a:p>
+                  </a:txBody>
+                  <a:tcPr anchor="t" marL="91440" marR="91440">
+                    <a:lnL>
+                      <a:noFill/>
+                    </a:lnL>
+                    <a:lnR>
+                      <a:noFill/>
+                    </a:lnR>
+                    <a:lnT>
+                      <a:noFill/>
+                    </a:lnT>
+                    <a:lnB>
+                      <a:noFill/>
+                    </a:lnB>
+                    <a:solidFill>
+                      <a:srgbClr val="156082"/>
+                    </a:solidFill>
+                  </a:tcPr>
+                </a:tc>
+              </a:tr>
+              <a:tr h="780120">
+                <a:tc>
+                  <a:txBody>
+                    <a:bodyPr anchor="t">
+                      <a:noAutofit/>
+                    </a:bodyPr>
+                    <a:p>
+                      <a:pPr algn="r">
+                        <a:lnSpc>
+                          <a:spcPct val="120000"/>
+                        </a:lnSpc>
+                      </a:pPr>
+                      <a:r>
+                        <a:rPr b="0" lang="en-CA" sz="1800" strike="noStrike" u="none">
+                          <a:solidFill>
+                            <a:srgbClr val="666666"/>
+                          </a:solidFill>
+                          <a:uFillTx/>
+                          <a:latin typeface="Apple Symbols"/>
+                          <a:ea typeface="PingFang SC"/>
+                        </a:rPr>
+                        <a:t>Total Remaining:</a:t>
+                      </a:r>
+                      <a:endParaRPr b="0" lang="en-CA" sz="1800" strike="noStrike" u="none">
+                        <a:solidFill>
+                          <a:srgbClr val="ffffff"/>
+                        </a:solidFill>
+                        <a:uFillTx/>
+                        <a:latin typeface="Times New Roman"/>
+                      </a:endParaRPr>
+                    </a:p>
+                  </a:txBody>
+                  <a:tcPr anchor="t" marL="91440" marR="91440">
+                    <a:lnL>
+                      <a:noFill/>
+                    </a:lnL>
+                    <a:lnR>
+                      <a:noFill/>
+                    </a:lnR>
+                    <a:lnT>
+                      <a:noFill/>
+                    </a:lnT>
+                    <a:lnB>
+                      <a:noFill/>
+                    </a:lnB>
+                    <a:solidFill>
+                      <a:srgbClr val="156082"/>
+                    </a:solidFill>
+                  </a:tcPr>
+                </a:tc>
+                <a:tc>
+                  <a:txBody>
+                    <a:bodyPr anchor="t">
+                      <a:noAutofit/>
+                    </a:bodyPr>
+                    <a:p>
+                      <a:pPr algn="r">
+                        <a:lnSpc>
+                          <a:spcPct val="120000"/>
+                        </a:lnSpc>
+                      </a:pPr>
+                      <a:r>
+                        <a:rPr b="0" lang="en-CA" sz="1800" strike="noStrike" u="none">
+                          <a:solidFill>
+                            <a:srgbClr val="0084d1"/>
+                          </a:solidFill>
+                          <a:uFillTx/>
+                          <a:latin typeface="Apple Symbols"/>
+                          <a:ea typeface="Apple Symbols"/>
+                        </a:rPr>
+                        <a:t>7,054,034 €</a:t>
+                      </a:r>
+                      <a:endParaRPr b="0" lang="en-CA" sz="1800" strike="noStrike" u="none">
+                        <a:solidFill>
+                          <a:srgbClr val="ffffff"/>
+                        </a:solidFill>
+                        <a:uFillTx/>
+                        <a:latin typeface="Times New Roman"/>
+                      </a:endParaRPr>
+                    </a:p>
+                  </a:txBody>
+                  <a:tcPr anchor="t" marL="91440" marR="91440">
+                    <a:lnL>
+                      <a:noFill/>
+                    </a:lnL>
+                    <a:lnR>
+                      <a:noFill/>
+                    </a:lnR>
+                    <a:lnT>
+                      <a:noFill/>
+                    </a:lnT>
+                    <a:lnB>
+                      <a:noFill/>
+                    </a:lnB>
+                    <a:solidFill>
+                      <a:srgbClr val="156082"/>
+                    </a:solidFill>
+                  </a:tcPr>
+                </a:tc>
+              </a:tr>
+              <a:tr h="781560">
+                <a:tc>
+                  <a:txBody>
+                    <a:bodyPr anchor="t">
+                      <a:noAutofit/>
+                    </a:bodyPr>
+                    <a:p>
+                      <a:pPr algn="r">
+                        <a:lnSpc>
+                          <a:spcPct val="120000"/>
+                        </a:lnSpc>
+                      </a:pPr>
+                      <a:r>
+                        <a:rPr b="0" lang="en-CA" sz="1800" strike="noStrike" u="none">
+                          <a:solidFill>
+                            <a:srgbClr val="666666"/>
+                          </a:solidFill>
+                          <a:uFillTx/>
+                          <a:latin typeface="Apple Symbols"/>
+                          <a:ea typeface="PingFang SC"/>
+                        </a:rPr>
+                        <a:t>Total Paid-In Capital:</a:t>
+                      </a:r>
+                      <a:endParaRPr b="0" lang="en-CA" sz="1800" strike="noStrike" u="none">
+                        <a:solidFill>
+                          <a:srgbClr val="ffffff"/>
+                        </a:solidFill>
+                        <a:uFillTx/>
+                        <a:latin typeface="Times New Roman"/>
+                      </a:endParaRPr>
+                    </a:p>
+                  </a:txBody>
+                  <a:tcPr anchor="t" marL="91440" marR="91440">
+                    <a:lnL>
+                      <a:noFill/>
+                    </a:lnL>
+                    <a:lnR>
+                      <a:noFill/>
+                    </a:lnR>
+                    <a:lnT>
+                      <a:noFill/>
+                    </a:lnT>
+                    <a:lnB>
+                      <a:noFill/>
+                    </a:lnB>
+                    <a:solidFill>
+                      <a:srgbClr val="156082"/>
+                    </a:solidFill>
+                  </a:tcPr>
+                </a:tc>
+                <a:tc>
+                  <a:txBody>
+                    <a:bodyPr anchor="t">
+                      <a:noAutofit/>
+                    </a:bodyPr>
+                    <a:p>
+                      <a:pPr algn="r">
+                        <a:lnSpc>
+                          <a:spcPct val="120000"/>
+                        </a:lnSpc>
+                      </a:pPr>
+                      <a:r>
+                        <a:rPr b="0" lang="en-CA" sz="1800" strike="noStrike" u="none">
+                          <a:solidFill>
+                            <a:srgbClr val="0084d1"/>
+                          </a:solidFill>
+                          <a:uFillTx/>
+                          <a:latin typeface="Apple Symbols"/>
+                          <a:ea typeface="Apple Symbols"/>
+                        </a:rPr>
+                        <a:t>2,000,000 €</a:t>
+                      </a:r>
+                      <a:endParaRPr b="0" lang="en-CA" sz="1800" strike="noStrike" u="none">
+                        <a:solidFill>
+                          <a:srgbClr val="ffffff"/>
+                        </a:solidFill>
+                        <a:uFillTx/>
+                        <a:latin typeface="Times New Roman"/>
+                      </a:endParaRPr>
+                    </a:p>
+                  </a:txBody>
+                  <a:tcPr anchor="t" marL="91440" marR="91440">
+                    <a:lnL>
+                      <a:noFill/>
+                    </a:lnL>
+                    <a:lnR>
+                      <a:noFill/>
+                    </a:lnR>
+                    <a:lnT>
+                      <a:noFill/>
+                    </a:lnT>
+                    <a:lnB>
+                      <a:noFill/>
+                    </a:lnB>
+                    <a:solidFill>
+                      <a:srgbClr val="156082"/>
+                    </a:solidFill>
+                  </a:tcPr>
+                </a:tc>
+              </a:tr>
+            </a:tbl>
+          </a:graphicData>
+        </a:graphic>
+      </p:graphicFrame>
+    </p:spTree>
+  </p:cSld>
+  <mc:AlternateContent>
+    <mc:Choice Requires="p14">
+      <p:transition spd="slow" p14:dur="3000"/>
+    </mc:Choice>
+    <mc:Fallback>
+      <p:transition spd="slow"/>
+    </mc:Fallback>
+  </mc:AlternateContent>
+</p:sld>
+</file>
+
+<file path=ppt/slides/slide8.xml><?xml version="1.0" encoding="utf-8"?>
+<p:sld xmlns:a="http://schemas.openxmlformats.org/drawingml/2006/main" xmlns:p="http://schemas.openxmlformats.org/presentationml/2006/main" xmlns:r="http://schemas.openxmlformats.org/officeDocument/2006/relationships" xmlns:p14="http://schemas.microsoft.com/office/powerpoint/2010/main" xmlns:p15="http://schemas.microsoft.com/office/powerpoint/2012/main" xmlns:mc="http://schemas.openxmlformats.org/markup-compatibility/2006">
+  <p:cSld>
+    <p:bg>
+      <p:bgPr>
+        <a:solidFill>
+          <a:srgbClr val="ffffff"/>
+        </a:solidFill>
+      </p:bgPr>
+    </p:bg>
+    <p:spTree>
+      <p:nvGrpSpPr>
+        <p:cNvPr id="1" name=""/>
+        <p:cNvGrpSpPr/>
+        <p:nvPr/>
+      </p:nvGrpSpPr>
+      <p:grpSpPr>
+        <a:xfrm>
+          <a:off x="0" y="0"/>
+          <a:ext cx="0" cy="0"/>
+          <a:chOff x="0" y="0"/>
+          <a:chExt cx="0" cy="0"/>
+        </a:xfrm>
+      </p:grpSpPr>
+      <p:sp>
+        <p:nvSpPr>
+          <p:cNvPr id="154" name="PlaceHolder 1"/>
+          <p:cNvSpPr>
+            <a:spLocks noGrp="1"/>
+          </p:cNvSpPr>
+          <p:nvPr>
+            <p:ph type="title"/>
+          </p:nvPr>
+        </p:nvSpPr>
+        <p:spPr>
+          <a:xfrm>
+            <a:off x="360000" y="180000"/>
+            <a:ext cx="3960000" cy="1241640"/>
+          </a:xfrm>
+          <a:prstGeom prst="rect">
+            <a:avLst/>
+          </a:prstGeom>
+          <a:noFill/>
+          <a:ln w="19080">
+            <a:noFill/>
+          </a:ln>
+        </p:spPr>
+        <p:txBody>
+          <a:bodyPr lIns="0" rIns="0" tIns="0" bIns="0" anchor="ctr">
+            <a:noAutofit/>
+          </a:bodyPr>
+          <a:p>
+            <a:pPr indent="0">
+              <a:lnSpc>
+                <a:spcPct val="100000"/>
+              </a:lnSpc>
+              <a:buNone/>
+            </a:pPr>
+            <a:r>
+              <a:rPr b="0" lang="en-CA" sz="1800" strike="noStrike" u="none">
+                <a:solidFill>
+                  <a:srgbClr val="0084d1"/>
+                </a:solidFill>
+                <a:uFillTx/>
+                <a:latin typeface="Arial"/>
+                <a:ea typeface="Songti SC"/>
+              </a:rPr>
+              <a:t>Nvidia</a:t>
+            </a:r>
+            <a:br>
+              <a:rPr sz="100"/>
+            </a:br>
+            <a:br>
+              <a:rPr sz="100"/>
+            </a:br>
+            <a:r>
+              <a:rPr b="0" lang="en-CA" sz="1800" strike="noStrike" u="none">
+                <a:solidFill>
+                  <a:srgbClr val="0084d1"/>
+                </a:solidFill>
+                <a:uFillTx/>
+                <a:latin typeface="Arial"/>
+                <a:ea typeface="Songti SC"/>
+              </a:rPr>
+              <a:t>United States of America</a:t>
+            </a:r>
+            <a:endParaRPr b="0" lang="en-CA" sz="1800" strike="noStrike" u="none">
+              <a:solidFill>
+                <a:srgbClr val="000000"/>
+              </a:solidFill>
+              <a:uFillTx/>
+              <a:latin typeface="Arial"/>
+            </a:endParaRPr>
+          </a:p>
+        </p:txBody>
+      </p:sp>
+      <p:pic>
+        <p:nvPicPr>
           <p:cNvPr id="155" name="Graphic 1" descr=""/>
           <p:cNvPicPr/>
           <p:nvPr/>
         </p:nvPicPr>
         <p:blipFill>
-          <a:blip r:embed="rId1">
-            <a:extLst>
-              <a:ext uri="{96DAC541-7B7A-43D3-8B79-37D633B846F1}">
-                <asvg:svgBlip xmlns:asvg="http://schemas.microsoft.com/office/drawing/2016/SVG/main" r:embed="rId2"/>
-              </a:ext>
-            </a:extLst>
-          </a:blip>
+          <a:blip r:embed="rId1"/>
           <a:stretch/>
         </p:blipFill>
         <p:spPr>
@@ -15478,7 +15974,7 @@
                           <a:latin typeface="Apple Symbols"/>
                           <a:ea typeface="Apple Symbols"/>
                         </a:rPr>
-                        <a:t>$18,244,800</a:t>
+                        <a:t>16,000,000 €</a:t>
                       </a:r>
                       <a:endParaRPr b="0" lang="en-CA" sz="1800" strike="noStrike" u="none">
                         <a:solidFill>
@@ -15578,7 +16074,7 @@
                           <a:latin typeface="Apple Symbols"/>
                           <a:ea typeface="Apple Symbols"/>
                         </a:rPr>
-                        <a:t>$3,762,991</a:t>
+                        <a:t>3,300,001 €</a:t>
                       </a:r>
                       <a:endParaRPr b="0" lang="en-CA" sz="1800" strike="noStrike" u="none">
                         <a:solidFill>
@@ -15678,7 +16174,7 @@
                           <a:latin typeface="Apple Symbols"/>
                           <a:ea typeface="Apple Symbols"/>
                         </a:rPr>
-                        <a:t>$63,729</a:t>
+                        <a:t>55,888 €</a:t>
                       </a:r>
                       <a:endParaRPr b="0" lang="en-CA" sz="1800" strike="noStrike" u="none">
                         <a:solidFill>
@@ -15778,7 +16274,7 @@
                           <a:latin typeface="Apple Symbols"/>
                           <a:ea typeface="Apple Symbols"/>
                         </a:rPr>
-                        <a:t>$8,043,715</a:t>
+                        <a:t>7,054,034 €</a:t>
                       </a:r>
                       <a:endParaRPr b="0" lang="en-CA" sz="1800" strike="noStrike" u="none">
                         <a:solidFill>
@@ -15878,7 +16374,7 @@
                           <a:latin typeface="Apple Symbols"/>
                           <a:ea typeface="Apple Symbols"/>
                         </a:rPr>
-                        <a:t>$2,280,600</a:t>
+                        <a:t>2,000,000 €</a:t>
                       </a:r>
                       <a:endParaRPr b="0" lang="en-CA" sz="1800" strike="noStrike" u="none">
                         <a:solidFill>
@@ -15912,55 +16408,6 @@
           </a:graphicData>
         </a:graphic>
       </p:graphicFrame>
-      <p:sp>
-        <p:nvSpPr>
-          <p:cNvPr id="158" name="TextBox 6"/>
-          <p:cNvSpPr txBox="1"/>
-          <p:nvPr/>
-        </p:nvSpPr>
-        <p:spPr>
-          <a:xfrm>
-            <a:off x="6379560" y="1140480"/>
-            <a:ext cx="3517200" cy="914760"/>
-          </a:xfrm>
-          <a:prstGeom prst="rect">
-            <a:avLst/>
-          </a:prstGeom>
-          <a:noFill/>
-          <a:ln w="0">
-            <a:noFill/>
-          </a:ln>
-        </p:spPr>
-        <p:txBody>
-          <a:bodyPr anchor="t">
-            <a:noAutofit/>
-          </a:bodyPr>
-          <a:p>
-            <a:pPr>
-              <a:lnSpc>
-                <a:spcPct val="100000"/>
-              </a:lnSpc>
-            </a:pPr>
-            <a:r>
-              <a:rPr b="0" lang="en-US" sz="1800" strike="noStrike" u="none">
-                <a:solidFill>
-                  <a:srgbClr val="000000"/>
-                </a:solidFill>
-                <a:uFillTx/>
-                <a:latin typeface="Aptos"/>
-              </a:rPr>
-              <a:t>https://storage.googleapis.com/freshtracks_public/other/NewCo-1727718322707.png</a:t>
-            </a:r>
-            <a:endParaRPr b="0" lang="en-CA" sz="1800" strike="noStrike" u="none">
-              <a:solidFill>
-                <a:srgbClr val="000000"/>
-              </a:solidFill>
-              <a:uFillTx/>
-              <a:latin typeface="Arial"/>
-            </a:endParaRPr>
-          </a:p>
-        </p:txBody>
-      </p:sp>
     </p:spTree>
   </p:cSld>
   <mc:AlternateContent>
@@ -15974,7 +16421,7 @@
 </p:sld>
 </file>
 
-<file path=ppt/slides/slide8.xml><?xml version="1.0" encoding="utf-8"?>
+<file path=ppt/slides/slide9.xml><?xml version="1.0" encoding="utf-8"?>
 <p:sld xmlns:a="http://schemas.openxmlformats.org/drawingml/2006/main" xmlns:p="http://schemas.openxmlformats.org/presentationml/2006/main" xmlns:r="http://schemas.openxmlformats.org/officeDocument/2006/relationships" xmlns:p14="http://schemas.microsoft.com/office/powerpoint/2010/main" xmlns:p15="http://schemas.microsoft.com/office/powerpoint/2012/main" xmlns:mc="http://schemas.openxmlformats.org/markup-compatibility/2006">
   <p:cSld>
     <p:bg>
@@ -16000,7 +16447,7 @@
       </p:grpSpPr>
       <p:sp>
         <p:nvSpPr>
-          <p:cNvPr id="159" name="PlaceHolder 1"/>
+          <p:cNvPr id="158" name="PlaceHolder 1"/>
           <p:cNvSpPr>
             <a:spLocks noGrp="1"/>
           </p:cNvSpPr>
@@ -16041,11 +16488,8 @@
                 <a:latin typeface="Arial"/>
                 <a:ea typeface="Songti SC"/>
               </a:rPr>
-              <a:t>Nvidia</a:t>
+              <a:t>PropertyInvest</a:t>
             </a:r>
-            <a:br>
-              <a:rPr sz="100"/>
-            </a:br>
             <a:br>
               <a:rPr sz="100"/>
             </a:br>
@@ -16058,7 +16502,21 @@
                 <a:latin typeface="Arial"/>
                 <a:ea typeface="Songti SC"/>
               </a:rPr>
-              <a:t>United States of America</a:t>
+              <a:t>Real Estate</a:t>
+            </a:r>
+            <a:br>
+              <a:rPr sz="100"/>
+            </a:br>
+            <a:r>
+              <a:rPr b="0" lang="en-CA" sz="1800" strike="noStrike" u="none">
+                <a:solidFill>
+                  <a:srgbClr val="0084d1"/>
+                </a:solidFill>
+                <a:uFillTx/>
+                <a:latin typeface="Arial"/>
+                <a:ea typeface="Songti SC"/>
+              </a:rPr>
+              <a:t>Canada</a:t>
             </a:r>
             <a:endParaRPr b="0" lang="en-CA" sz="1800" strike="noStrike" u="none">
               <a:solidFill>
@@ -16072,7 +16530,7 @@
       </p:sp>
       <p:pic>
         <p:nvPicPr>
-          <p:cNvPr id="160" name="Graphic 1" descr=""/>
+          <p:cNvPr id="159" name="Graphic 1" descr=""/>
           <p:cNvPicPr/>
           <p:nvPr/>
         </p:nvPicPr>
@@ -16101,7 +16559,7 @@
       </p:pic>
       <p:sp>
         <p:nvSpPr>
-          <p:cNvPr id="161" name="Rectangle 3"/>
+          <p:cNvPr id="160" name="Rectangle 3"/>
           <p:cNvSpPr/>
           <p:nvPr/>
         </p:nvSpPr>
@@ -16161,7 +16619,7 @@
       </p:sp>
       <p:graphicFrame>
         <p:nvGraphicFramePr>
-          <p:cNvPr id="162" name="Table 4"/>
+          <p:cNvPr id="161" name="Table 4"/>
           <p:cNvGraphicFramePr/>
           <p:nvPr/>
         </p:nvGraphicFramePr>
@@ -16247,7 +16705,7 @@
                           <a:latin typeface="Apple Symbols"/>
                           <a:ea typeface="Apple Symbols"/>
                         </a:rPr>
-                        <a:t>$18,244,800</a:t>
+                        <a:t>16,000,000 €</a:t>
                       </a:r>
                       <a:endParaRPr b="0" lang="en-CA" sz="1800" strike="noStrike" u="none">
                         <a:solidFill>
@@ -16347,7 +16805,7 @@
                           <a:latin typeface="Apple Symbols"/>
                           <a:ea typeface="Apple Symbols"/>
                         </a:rPr>
-                        <a:t>$3,762,991</a:t>
+                        <a:t>3,300,001 €</a:t>
                       </a:r>
                       <a:endParaRPr b="0" lang="en-CA" sz="1800" strike="noStrike" u="none">
                         <a:solidFill>
@@ -16447,7 +16905,7 @@
                           <a:latin typeface="Apple Symbols"/>
                           <a:ea typeface="Apple Symbols"/>
                         </a:rPr>
-                        <a:t>$63,729</a:t>
+                        <a:t>55,888 €</a:t>
                       </a:r>
                       <a:endParaRPr b="0" lang="en-CA" sz="1800" strike="noStrike" u="none">
                         <a:solidFill>
@@ -16547,7 +17005,7 @@
                           <a:latin typeface="Apple Symbols"/>
                           <a:ea typeface="Apple Symbols"/>
                         </a:rPr>
-                        <a:t>$8,043,715</a:t>
+                        <a:t>7,054,034 €</a:t>
                       </a:r>
                       <a:endParaRPr b="0" lang="en-CA" sz="1800" strike="noStrike" u="none">
                         <a:solidFill>
@@ -16647,7 +17105,7 @@
                           <a:latin typeface="Apple Symbols"/>
                           <a:ea typeface="Apple Symbols"/>
                         </a:rPr>
-                        <a:t>$2,280,600</a:t>
+                        <a:t>2,000,000 €</a:t>
                       </a:r>
                       <a:endParaRPr b="0" lang="en-CA" sz="1800" strike="noStrike" u="none">
                         <a:solidFill>
@@ -16681,820 +17139,6 @@
           </a:graphicData>
         </a:graphic>
       </p:graphicFrame>
-      <p:sp>
-        <p:nvSpPr>
-          <p:cNvPr id="163" name="TextBox 6"/>
-          <p:cNvSpPr txBox="1"/>
-          <p:nvPr/>
-        </p:nvSpPr>
-        <p:spPr>
-          <a:xfrm>
-            <a:off x="6379560" y="1140480"/>
-            <a:ext cx="3517200" cy="914760"/>
-          </a:xfrm>
-          <a:prstGeom prst="rect">
-            <a:avLst/>
-          </a:prstGeom>
-          <a:noFill/>
-          <a:ln w="0">
-            <a:noFill/>
-          </a:ln>
-        </p:spPr>
-        <p:txBody>
-          <a:bodyPr anchor="t">
-            <a:noAutofit/>
-          </a:bodyPr>
-          <a:p>
-            <a:pPr>
-              <a:lnSpc>
-                <a:spcPct val="100000"/>
-              </a:lnSpc>
-            </a:pPr>
-            <a:r>
-              <a:rPr b="0" lang="en-US" sz="1800" strike="noStrike" u="none">
-                <a:solidFill>
-                  <a:srgbClr val="000000"/>
-                </a:solidFill>
-                <a:uFillTx/>
-                <a:latin typeface="Aptos"/>
-              </a:rPr>
-              <a:t>https://storage.googleapis.com/freshtracks_public/other/Nvidia-1727718320796.png</a:t>
-            </a:r>
-            <a:endParaRPr b="0" lang="en-CA" sz="1800" strike="noStrike" u="none">
-              <a:solidFill>
-                <a:srgbClr val="000000"/>
-              </a:solidFill>
-              <a:uFillTx/>
-              <a:latin typeface="Arial"/>
-            </a:endParaRPr>
-          </a:p>
-        </p:txBody>
-      </p:sp>
-    </p:spTree>
-  </p:cSld>
-  <mc:AlternateContent>
-    <mc:Choice Requires="p14">
-      <p:transition spd="slow" p14:dur="3000"/>
-    </mc:Choice>
-    <mc:Fallback>
-      <p:transition spd="slow"/>
-    </mc:Fallback>
-  </mc:AlternateContent>
-</p:sld>
-</file>
-
-<file path=ppt/slides/slide9.xml><?xml version="1.0" encoding="utf-8"?>
-<p:sld xmlns:a="http://schemas.openxmlformats.org/drawingml/2006/main" xmlns:p="http://schemas.openxmlformats.org/presentationml/2006/main" xmlns:r="http://schemas.openxmlformats.org/officeDocument/2006/relationships" xmlns:p14="http://schemas.microsoft.com/office/powerpoint/2010/main" xmlns:p15="http://schemas.microsoft.com/office/powerpoint/2012/main" xmlns:mc="http://schemas.openxmlformats.org/markup-compatibility/2006">
-  <p:cSld>
-    <p:bg>
-      <p:bgPr>
-        <a:solidFill>
-          <a:srgbClr val="ffffff"/>
-        </a:solidFill>
-      </p:bgPr>
-    </p:bg>
-    <p:spTree>
-      <p:nvGrpSpPr>
-        <p:cNvPr id="1" name=""/>
-        <p:cNvGrpSpPr/>
-        <p:nvPr/>
-      </p:nvGrpSpPr>
-      <p:grpSpPr>
-        <a:xfrm>
-          <a:off x="0" y="0"/>
-          <a:ext cx="0" cy="0"/>
-          <a:chOff x="0" y="0"/>
-          <a:chExt cx="0" cy="0"/>
-        </a:xfrm>
-      </p:grpSpPr>
-      <p:sp>
-        <p:nvSpPr>
-          <p:cNvPr id="164" name="PlaceHolder 1"/>
-          <p:cNvSpPr>
-            <a:spLocks noGrp="1"/>
-          </p:cNvSpPr>
-          <p:nvPr>
-            <p:ph type="title"/>
-          </p:nvPr>
-        </p:nvSpPr>
-        <p:spPr>
-          <a:xfrm>
-            <a:off x="360000" y="180000"/>
-            <a:ext cx="3960000" cy="1241640"/>
-          </a:xfrm>
-          <a:prstGeom prst="rect">
-            <a:avLst/>
-          </a:prstGeom>
-          <a:noFill/>
-          <a:ln w="19080">
-            <a:noFill/>
-          </a:ln>
-        </p:spPr>
-        <p:txBody>
-          <a:bodyPr lIns="0" rIns="0" tIns="0" bIns="0" anchor="ctr">
-            <a:noAutofit/>
-          </a:bodyPr>
-          <a:p>
-            <a:pPr indent="0">
-              <a:lnSpc>
-                <a:spcPct val="100000"/>
-              </a:lnSpc>
-              <a:buNone/>
-            </a:pPr>
-            <a:r>
-              <a:rPr b="0" lang="en-CA" sz="1800" strike="noStrike" u="none">
-                <a:solidFill>
-                  <a:srgbClr val="0084d1"/>
-                </a:solidFill>
-                <a:uFillTx/>
-                <a:latin typeface="Arial"/>
-                <a:ea typeface="Songti SC"/>
-              </a:rPr>
-              <a:t>PropertyInvest</a:t>
-            </a:r>
-            <a:br>
-              <a:rPr sz="100"/>
-            </a:br>
-            <a:r>
-              <a:rPr b="0" lang="en-CA" sz="1800" strike="noStrike" u="none">
-                <a:solidFill>
-                  <a:srgbClr val="0084d1"/>
-                </a:solidFill>
-                <a:uFillTx/>
-                <a:latin typeface="Arial"/>
-                <a:ea typeface="Songti SC"/>
-              </a:rPr>
-              <a:t>Real Estate</a:t>
-            </a:r>
-            <a:br>
-              <a:rPr sz="100"/>
-            </a:br>
-            <a:r>
-              <a:rPr b="0" lang="en-CA" sz="1800" strike="noStrike" u="none">
-                <a:solidFill>
-                  <a:srgbClr val="0084d1"/>
-                </a:solidFill>
-                <a:uFillTx/>
-                <a:latin typeface="Arial"/>
-                <a:ea typeface="Songti SC"/>
-              </a:rPr>
-              <a:t>Canada</a:t>
-            </a:r>
-            <a:endParaRPr b="0" lang="en-CA" sz="1800" strike="noStrike" u="none">
-              <a:solidFill>
-                <a:srgbClr val="000000"/>
-              </a:solidFill>
-              <a:uFillTx/>
-              <a:latin typeface="Arial"/>
-            </a:endParaRPr>
-          </a:p>
-        </p:txBody>
-      </p:sp>
-      <p:pic>
-        <p:nvPicPr>
-          <p:cNvPr id="165" name="Graphic 1" descr=""/>
-          <p:cNvPicPr/>
-          <p:nvPr/>
-        </p:nvPicPr>
-        <p:blipFill>
-          <a:blip r:embed="rId1">
-            <a:extLst>
-              <a:ext uri="{96DAC541-7B7A-43D3-8B79-37D633B846F1}">
-                <asvg:svgBlip xmlns:asvg="http://schemas.microsoft.com/office/drawing/2016/SVG/main" r:embed="rId2"/>
-              </a:ext>
-            </a:extLst>
-          </a:blip>
-          <a:stretch/>
-        </p:blipFill>
-        <p:spPr>
-          <a:xfrm>
-            <a:off x="8982360" y="226080"/>
-            <a:ext cx="914400" cy="914400"/>
-          </a:xfrm>
-          <a:prstGeom prst="rect">
-            <a:avLst/>
-          </a:prstGeom>
-          <a:ln w="19080">
-            <a:noFill/>
-          </a:ln>
-        </p:spPr>
-      </p:pic>
-      <p:sp>
-        <p:nvSpPr>
-          <p:cNvPr id="166" name="Rectangle 3"/>
-          <p:cNvSpPr/>
-          <p:nvPr/>
-        </p:nvSpPr>
-        <p:spPr>
-          <a:xfrm>
-            <a:off x="1890720" y="2833560"/>
-            <a:ext cx="10080720" cy="457200"/>
-          </a:xfrm>
-          <a:custGeom>
-            <a:avLst/>
-            <a:gdLst/>
-            <a:ahLst/>
-            <a:rect l="l" t="t" r="r" b="b"/>
-            <a:pathLst>
-              <a:path w="21600" h="21600">
-                <a:moveTo>
-                  <a:pt x="0" y="0"/>
-                </a:moveTo>
-                <a:lnTo>
-                  <a:pt x="21600" y="0"/>
-                </a:lnTo>
-                <a:lnTo>
-                  <a:pt x="21600" y="21600"/>
-                </a:lnTo>
-                <a:lnTo>
-                  <a:pt x="0" y="21600"/>
-                </a:lnTo>
-                <a:close/>
-              </a:path>
-            </a:pathLst>
-          </a:custGeom>
-          <a:noFill/>
-          <a:ln w="0">
-            <a:noFill/>
-          </a:ln>
-        </p:spPr>
-        <p:style>
-          <a:lnRef idx="0"/>
-          <a:fillRef idx="0"/>
-          <a:effectRef idx="0"/>
-          <a:fontRef idx="minor"/>
-        </p:style>
-        <p:txBody>
-          <a:bodyPr wrap="none" anchor="ctr">
-            <a:spAutoFit/>
-          </a:bodyPr>
-          <a:p>
-            <a:endParaRPr b="0" lang="en-CA" sz="1800" strike="noStrike" u="none">
-              <a:solidFill>
-                <a:srgbClr val="000000"/>
-              </a:solidFill>
-              <a:uFillTx/>
-              <a:latin typeface="Arial"/>
-            </a:endParaRPr>
-          </a:p>
-        </p:txBody>
-      </p:sp>
-      <p:graphicFrame>
-        <p:nvGraphicFramePr>
-          <p:cNvPr id="167" name="Table 4"/>
-          <p:cNvGraphicFramePr/>
-          <p:nvPr/>
-        </p:nvGraphicFramePr>
-        <p:xfrm>
-          <a:off x="463680" y="1655640"/>
-          <a:ext cx="6413760" cy="3680280"/>
-        </p:xfrm>
-        <a:graphic>
-          <a:graphicData uri="http://schemas.openxmlformats.org/drawingml/2006/table">
-            <a:tbl>
-              <a:tblPr/>
-              <a:tblGrid>
-                <a:gridCol w="1382400"/>
-                <a:gridCol w="5031360"/>
-              </a:tblGrid>
-              <a:tr h="780120">
-                <a:tc>
-                  <a:txBody>
-                    <a:bodyPr anchor="t">
-                      <a:noAutofit/>
-                    </a:bodyPr>
-                    <a:p>
-                      <a:pPr algn="r">
-                        <a:lnSpc>
-                          <a:spcPct val="120000"/>
-                        </a:lnSpc>
-                      </a:pPr>
-                      <a:r>
-                        <a:rPr b="0" lang="en-CA" sz="1800" strike="noStrike" u="none">
-                          <a:solidFill>
-                            <a:srgbClr val="666666"/>
-                          </a:solidFill>
-                          <a:uFillTx/>
-                          <a:latin typeface="Apple Symbols"/>
-                          <a:ea typeface="PingFang SC"/>
-                        </a:rPr>
-                        <a:t>Committed Capital:</a:t>
-                      </a:r>
-                      <a:endParaRPr b="0" lang="en-CA" sz="1800" strike="noStrike" u="none">
-                        <a:solidFill>
-                          <a:srgbClr val="ffffff"/>
-                        </a:solidFill>
-                        <a:uFillTx/>
-                        <a:latin typeface="Times New Roman"/>
-                      </a:endParaRPr>
-                    </a:p>
-                  </a:txBody>
-                  <a:tcPr anchor="t" marL="91440" marR="91440">
-                    <a:lnL>
-                      <a:noFill/>
-                    </a:lnL>
-                    <a:lnR>
-                      <a:noFill/>
-                    </a:lnR>
-                    <a:lnT>
-                      <a:noFill/>
-                    </a:lnT>
-                    <a:lnB>
-                      <a:noFill/>
-                    </a:lnB>
-                    <a:solidFill>
-                      <a:srgbClr val="156082"/>
-                    </a:solidFill>
-                  </a:tcPr>
-                </a:tc>
-                <a:tc>
-                  <a:txBody>
-                    <a:bodyPr anchor="t">
-                      <a:noAutofit/>
-                    </a:bodyPr>
-                    <a:p>
-                      <a:pPr algn="r">
-                        <a:lnSpc>
-                          <a:spcPct val="120000"/>
-                        </a:lnSpc>
-                      </a:pPr>
-                      <a:r>
-                        <a:rPr b="0" lang="en-CA" sz="1800" strike="noStrike" u="none">
-                          <a:solidFill>
-                            <a:srgbClr val="0084d1"/>
-                          </a:solidFill>
-                          <a:uFillTx/>
-                          <a:latin typeface="Apple Symbols"/>
-                          <a:ea typeface="Apple Symbols"/>
-                        </a:rPr>
-                        <a:t>$18,244,800</a:t>
-                      </a:r>
-                      <a:endParaRPr b="0" lang="en-CA" sz="1800" strike="noStrike" u="none">
-                        <a:solidFill>
-                          <a:srgbClr val="ffffff"/>
-                        </a:solidFill>
-                        <a:uFillTx/>
-                        <a:latin typeface="Times New Roman"/>
-                      </a:endParaRPr>
-                    </a:p>
-                  </a:txBody>
-                  <a:tcPr anchor="t" marL="91440" marR="91440">
-                    <a:lnL>
-                      <a:noFill/>
-                    </a:lnL>
-                    <a:lnR>
-                      <a:noFill/>
-                    </a:lnR>
-                    <a:lnT>
-                      <a:noFill/>
-                    </a:lnT>
-                    <a:lnB>
-                      <a:noFill/>
-                    </a:lnB>
-                    <a:solidFill>
-                      <a:srgbClr val="156082"/>
-                    </a:solidFill>
-                  </a:tcPr>
-                </a:tc>
-              </a:tr>
-              <a:tr h="558360">
-                <a:tc>
-                  <a:txBody>
-                    <a:bodyPr anchor="t">
-                      <a:noAutofit/>
-                    </a:bodyPr>
-                    <a:p>
-                      <a:pPr algn="r">
-                        <a:lnSpc>
-                          <a:spcPct val="120000"/>
-                        </a:lnSpc>
-                      </a:pPr>
-                      <a:r>
-                        <a:rPr b="0" lang="en-CA" sz="1800" strike="noStrike" u="none">
-                          <a:solidFill>
-                            <a:srgbClr val="666666"/>
-                          </a:solidFill>
-                          <a:uFillTx/>
-                          <a:latin typeface="Apple Symbols"/>
-                          <a:ea typeface="PingFang SC"/>
-                        </a:rPr>
-                        <a:t>Total Invested:</a:t>
-                      </a:r>
-                      <a:endParaRPr b="0" lang="en-CA" sz="1800" strike="noStrike" u="none">
-                        <a:solidFill>
-                          <a:srgbClr val="ffffff"/>
-                        </a:solidFill>
-                        <a:uFillTx/>
-                        <a:latin typeface="Times New Roman"/>
-                      </a:endParaRPr>
-                    </a:p>
-                  </a:txBody>
-                  <a:tcPr anchor="t" marL="91440" marR="91440">
-                    <a:lnL>
-                      <a:noFill/>
-                    </a:lnL>
-                    <a:lnR>
-                      <a:noFill/>
-                    </a:lnR>
-                    <a:lnT>
-                      <a:noFill/>
-                    </a:lnT>
-                    <a:lnB>
-                      <a:noFill/>
-                    </a:lnB>
-                    <a:solidFill>
-                      <a:srgbClr val="156082"/>
-                    </a:solidFill>
-                  </a:tcPr>
-                </a:tc>
-                <a:tc>
-                  <a:txBody>
-                    <a:bodyPr anchor="t">
-                      <a:noAutofit/>
-                    </a:bodyPr>
-                    <a:p>
-                      <a:pPr algn="r">
-                        <a:lnSpc>
-                          <a:spcPct val="120000"/>
-                        </a:lnSpc>
-                      </a:pPr>
-                      <a:r>
-                        <a:rPr b="0" lang="en-CA" sz="1800" strike="noStrike" u="none">
-                          <a:solidFill>
-                            <a:srgbClr val="0084d1"/>
-                          </a:solidFill>
-                          <a:uFillTx/>
-                          <a:latin typeface="Apple Symbols"/>
-                          <a:ea typeface="Apple Symbols"/>
-                        </a:rPr>
-                        <a:t>$3,762,991</a:t>
-                      </a:r>
-                      <a:endParaRPr b="0" lang="en-CA" sz="1800" strike="noStrike" u="none">
-                        <a:solidFill>
-                          <a:srgbClr val="ffffff"/>
-                        </a:solidFill>
-                        <a:uFillTx/>
-                        <a:latin typeface="Times New Roman"/>
-                      </a:endParaRPr>
-                    </a:p>
-                  </a:txBody>
-                  <a:tcPr anchor="t" marL="91440" marR="91440">
-                    <a:lnL>
-                      <a:noFill/>
-                    </a:lnL>
-                    <a:lnR>
-                      <a:noFill/>
-                    </a:lnR>
-                    <a:lnT>
-                      <a:noFill/>
-                    </a:lnT>
-                    <a:lnB>
-                      <a:noFill/>
-                    </a:lnB>
-                    <a:solidFill>
-                      <a:srgbClr val="156082"/>
-                    </a:solidFill>
-                  </a:tcPr>
-                </a:tc>
-              </a:tr>
-              <a:tr h="780120">
-                <a:tc>
-                  <a:txBody>
-                    <a:bodyPr anchor="t">
-                      <a:noAutofit/>
-                    </a:bodyPr>
-                    <a:p>
-                      <a:pPr algn="r">
-                        <a:lnSpc>
-                          <a:spcPct val="120000"/>
-                        </a:lnSpc>
-                      </a:pPr>
-                      <a:r>
-                        <a:rPr b="0" lang="en-CA" sz="1800" strike="noStrike" u="none">
-                          <a:solidFill>
-                            <a:srgbClr val="666666"/>
-                          </a:solidFill>
-                          <a:uFillTx/>
-                          <a:latin typeface="Apple Symbols"/>
-                          <a:ea typeface="PingFang SC"/>
-                        </a:rPr>
-                        <a:t>Total Distributed:</a:t>
-                      </a:r>
-                      <a:endParaRPr b="0" lang="en-CA" sz="1800" strike="noStrike" u="none">
-                        <a:solidFill>
-                          <a:srgbClr val="ffffff"/>
-                        </a:solidFill>
-                        <a:uFillTx/>
-                        <a:latin typeface="Times New Roman"/>
-                      </a:endParaRPr>
-                    </a:p>
-                  </a:txBody>
-                  <a:tcPr anchor="t" marL="91440" marR="91440">
-                    <a:lnL>
-                      <a:noFill/>
-                    </a:lnL>
-                    <a:lnR>
-                      <a:noFill/>
-                    </a:lnR>
-                    <a:lnT>
-                      <a:noFill/>
-                    </a:lnT>
-                    <a:lnB>
-                      <a:noFill/>
-                    </a:lnB>
-                    <a:solidFill>
-                      <a:srgbClr val="156082"/>
-                    </a:solidFill>
-                  </a:tcPr>
-                </a:tc>
-                <a:tc>
-                  <a:txBody>
-                    <a:bodyPr anchor="t">
-                      <a:noAutofit/>
-                    </a:bodyPr>
-                    <a:p>
-                      <a:pPr algn="r">
-                        <a:lnSpc>
-                          <a:spcPct val="120000"/>
-                        </a:lnSpc>
-                      </a:pPr>
-                      <a:r>
-                        <a:rPr b="0" lang="en-CA" sz="1800" strike="noStrike" u="none">
-                          <a:solidFill>
-                            <a:srgbClr val="0084d1"/>
-                          </a:solidFill>
-                          <a:uFillTx/>
-                          <a:latin typeface="Apple Symbols"/>
-                          <a:ea typeface="Apple Symbols"/>
-                        </a:rPr>
-                        <a:t>$63,729</a:t>
-                      </a:r>
-                      <a:endParaRPr b="0" lang="en-CA" sz="1800" strike="noStrike" u="none">
-                        <a:solidFill>
-                          <a:srgbClr val="ffffff"/>
-                        </a:solidFill>
-                        <a:uFillTx/>
-                        <a:latin typeface="Times New Roman"/>
-                      </a:endParaRPr>
-                    </a:p>
-                  </a:txBody>
-                  <a:tcPr anchor="t" marL="91440" marR="91440">
-                    <a:lnL>
-                      <a:noFill/>
-                    </a:lnL>
-                    <a:lnR>
-                      <a:noFill/>
-                    </a:lnR>
-                    <a:lnT>
-                      <a:noFill/>
-                    </a:lnT>
-                    <a:lnB>
-                      <a:noFill/>
-                    </a:lnB>
-                    <a:solidFill>
-                      <a:srgbClr val="156082"/>
-                    </a:solidFill>
-                  </a:tcPr>
-                </a:tc>
-              </a:tr>
-              <a:tr h="780120">
-                <a:tc>
-                  <a:txBody>
-                    <a:bodyPr anchor="t">
-                      <a:noAutofit/>
-                    </a:bodyPr>
-                    <a:p>
-                      <a:pPr algn="r">
-                        <a:lnSpc>
-                          <a:spcPct val="120000"/>
-                        </a:lnSpc>
-                      </a:pPr>
-                      <a:r>
-                        <a:rPr b="0" lang="en-CA" sz="1800" strike="noStrike" u="none">
-                          <a:solidFill>
-                            <a:srgbClr val="666666"/>
-                          </a:solidFill>
-                          <a:uFillTx/>
-                          <a:latin typeface="Apple Symbols"/>
-                          <a:ea typeface="PingFang SC"/>
-                        </a:rPr>
-                        <a:t>Total Remaining:</a:t>
-                      </a:r>
-                      <a:endParaRPr b="0" lang="en-CA" sz="1800" strike="noStrike" u="none">
-                        <a:solidFill>
-                          <a:srgbClr val="ffffff"/>
-                        </a:solidFill>
-                        <a:uFillTx/>
-                        <a:latin typeface="Times New Roman"/>
-                      </a:endParaRPr>
-                    </a:p>
-                  </a:txBody>
-                  <a:tcPr anchor="t" marL="91440" marR="91440">
-                    <a:lnL>
-                      <a:noFill/>
-                    </a:lnL>
-                    <a:lnR>
-                      <a:noFill/>
-                    </a:lnR>
-                    <a:lnT>
-                      <a:noFill/>
-                    </a:lnT>
-                    <a:lnB>
-                      <a:noFill/>
-                    </a:lnB>
-                    <a:solidFill>
-                      <a:srgbClr val="156082"/>
-                    </a:solidFill>
-                  </a:tcPr>
-                </a:tc>
-                <a:tc>
-                  <a:txBody>
-                    <a:bodyPr anchor="t">
-                      <a:noAutofit/>
-                    </a:bodyPr>
-                    <a:p>
-                      <a:pPr algn="r">
-                        <a:lnSpc>
-                          <a:spcPct val="120000"/>
-                        </a:lnSpc>
-                      </a:pPr>
-                      <a:r>
-                        <a:rPr b="0" lang="en-CA" sz="1800" strike="noStrike" u="none">
-                          <a:solidFill>
-                            <a:srgbClr val="0084d1"/>
-                          </a:solidFill>
-                          <a:uFillTx/>
-                          <a:latin typeface="Apple Symbols"/>
-                          <a:ea typeface="Apple Symbols"/>
-                        </a:rPr>
-                        <a:t>$8,043,715</a:t>
-                      </a:r>
-                      <a:endParaRPr b="0" lang="en-CA" sz="1800" strike="noStrike" u="none">
-                        <a:solidFill>
-                          <a:srgbClr val="ffffff"/>
-                        </a:solidFill>
-                        <a:uFillTx/>
-                        <a:latin typeface="Times New Roman"/>
-                      </a:endParaRPr>
-                    </a:p>
-                  </a:txBody>
-                  <a:tcPr anchor="t" marL="91440" marR="91440">
-                    <a:lnL>
-                      <a:noFill/>
-                    </a:lnL>
-                    <a:lnR>
-                      <a:noFill/>
-                    </a:lnR>
-                    <a:lnT>
-                      <a:noFill/>
-                    </a:lnT>
-                    <a:lnB>
-                      <a:noFill/>
-                    </a:lnB>
-                    <a:solidFill>
-                      <a:srgbClr val="156082"/>
-                    </a:solidFill>
-                  </a:tcPr>
-                </a:tc>
-              </a:tr>
-              <a:tr h="781560">
-                <a:tc>
-                  <a:txBody>
-                    <a:bodyPr anchor="t">
-                      <a:noAutofit/>
-                    </a:bodyPr>
-                    <a:p>
-                      <a:pPr algn="r">
-                        <a:lnSpc>
-                          <a:spcPct val="120000"/>
-                        </a:lnSpc>
-                      </a:pPr>
-                      <a:r>
-                        <a:rPr b="0" lang="en-CA" sz="1800" strike="noStrike" u="none">
-                          <a:solidFill>
-                            <a:srgbClr val="666666"/>
-                          </a:solidFill>
-                          <a:uFillTx/>
-                          <a:latin typeface="Apple Symbols"/>
-                          <a:ea typeface="PingFang SC"/>
-                        </a:rPr>
-                        <a:t>Total Paid-In Capital:</a:t>
-                      </a:r>
-                      <a:endParaRPr b="0" lang="en-CA" sz="1800" strike="noStrike" u="none">
-                        <a:solidFill>
-                          <a:srgbClr val="ffffff"/>
-                        </a:solidFill>
-                        <a:uFillTx/>
-                        <a:latin typeface="Times New Roman"/>
-                      </a:endParaRPr>
-                    </a:p>
-                  </a:txBody>
-                  <a:tcPr anchor="t" marL="91440" marR="91440">
-                    <a:lnL>
-                      <a:noFill/>
-                    </a:lnL>
-                    <a:lnR>
-                      <a:noFill/>
-                    </a:lnR>
-                    <a:lnT>
-                      <a:noFill/>
-                    </a:lnT>
-                    <a:lnB>
-                      <a:noFill/>
-                    </a:lnB>
-                    <a:solidFill>
-                      <a:srgbClr val="156082"/>
-                    </a:solidFill>
-                  </a:tcPr>
-                </a:tc>
-                <a:tc>
-                  <a:txBody>
-                    <a:bodyPr anchor="t">
-                      <a:noAutofit/>
-                    </a:bodyPr>
-                    <a:p>
-                      <a:pPr algn="r">
-                        <a:lnSpc>
-                          <a:spcPct val="120000"/>
-                        </a:lnSpc>
-                      </a:pPr>
-                      <a:r>
-                        <a:rPr b="0" lang="en-CA" sz="1800" strike="noStrike" u="none">
-                          <a:solidFill>
-                            <a:srgbClr val="0084d1"/>
-                          </a:solidFill>
-                          <a:uFillTx/>
-                          <a:latin typeface="Apple Symbols"/>
-                          <a:ea typeface="Apple Symbols"/>
-                        </a:rPr>
-                        <a:t>$2,280,600</a:t>
-                      </a:r>
-                      <a:endParaRPr b="0" lang="en-CA" sz="1800" strike="noStrike" u="none">
-                        <a:solidFill>
-                          <a:srgbClr val="ffffff"/>
-                        </a:solidFill>
-                        <a:uFillTx/>
-                        <a:latin typeface="Times New Roman"/>
-                      </a:endParaRPr>
-                    </a:p>
-                  </a:txBody>
-                  <a:tcPr anchor="t" marL="91440" marR="91440">
-                    <a:lnL>
-                      <a:noFill/>
-                    </a:lnL>
-                    <a:lnR>
-                      <a:noFill/>
-                    </a:lnR>
-                    <a:lnT>
-                      <a:noFill/>
-                    </a:lnT>
-                    <a:lnB>
-                      <a:noFill/>
-                    </a:lnB>
-                    <a:solidFill>
-                      <a:srgbClr val="156082"/>
-                    </a:solidFill>
-                  </a:tcPr>
-                </a:tc>
-              </a:tr>
-            </a:tbl>
-          </a:graphicData>
-        </a:graphic>
-      </p:graphicFrame>
-      <p:sp>
-        <p:nvSpPr>
-          <p:cNvPr id="168" name="TextBox 6"/>
-          <p:cNvSpPr txBox="1"/>
-          <p:nvPr/>
-        </p:nvSpPr>
-        <p:spPr>
-          <a:xfrm>
-            <a:off x="6379560" y="1140480"/>
-            <a:ext cx="3517200" cy="428760"/>
-          </a:xfrm>
-          <a:prstGeom prst="rect">
-            <a:avLst/>
-          </a:prstGeom>
-          <a:noFill/>
-          <a:ln w="0">
-            <a:noFill/>
-          </a:ln>
-        </p:spPr>
-        <p:txBody>
-          <a:bodyPr anchor="t">
-            <a:noAutofit/>
-          </a:bodyPr>
-          <a:p>
-            <a:endParaRPr b="0" lang="en-CA" sz="1800" strike="noStrike" u="none">
-              <a:solidFill>
-                <a:srgbClr val="000000"/>
-              </a:solidFill>
-              <a:uFillTx/>
-              <a:latin typeface="Arial"/>
-            </a:endParaRPr>
-          </a:p>
-        </p:txBody>
-      </p:sp>
     </p:spTree>
   </p:cSld>
   <mc:AlternateContent>

</xml_diff>

<commit_message>
nicer logging for ppt prod debugging
</commit_message>
<xml_diff>
--- a/result.pptx
+++ b/result.pptx
@@ -315,7 +315,7 @@
               </a:lnSpc>
               <a:buNone/>
             </a:pPr>
-            <a:fld id="{A1A109A2-A512-46AD-9387-1890526E9A50}" type="slidenum">
+            <a:fld id="{E3572950-CB11-4D44-904E-3BCAF97B43F6}" type="slidenum">
               <a:rPr b="0" lang="en-CA" sz="1400" strike="noStrike" u="none">
                 <a:solidFill>
                   <a:srgbClr val="000000"/>
@@ -388,7 +388,7 @@
                 <a:spcPct val="100000"/>
               </a:lnSpc>
             </a:pPr>
-            <a:fld id="{600E3E23-279B-43E4-BF6C-448B1F267F56}" type="slidenum">
+            <a:fld id="{397E3F05-B024-4BD9-BEF7-5833A9C5FE15}" type="slidenum">
               <a:rPr b="0" lang="en-CA" sz="1400" strike="noStrike" u="none">
                 <a:solidFill>
                   <a:srgbClr val="000000"/>
@@ -438,7 +438,7 @@
                 <a:spcPct val="100000"/>
               </a:lnSpc>
             </a:pPr>
-            <a:fld id="{1FC2AB03-EEF9-4223-9DAD-AB567FBD3518}" type="slidenum">
+            <a:fld id="{F8CDE2F8-0521-4CD9-80CA-FD5344079E1C}" type="slidenum">
               <a:rPr b="0" lang="en-CA" sz="1400" strike="noStrike" u="none">
                 <a:solidFill>
                   <a:srgbClr val="000000"/>
@@ -574,7 +574,7 @@
                 <a:spcPct val="100000"/>
               </a:lnSpc>
             </a:pPr>
-            <a:fld id="{6C9860AD-069A-48F7-BD80-9DC76041C421}" type="slidenum">
+            <a:fld id="{0ED611B4-020B-4F59-A6B7-2DC1798A502D}" type="slidenum">
               <a:rPr b="0" lang="en-CA" sz="1400" strike="noStrike" u="none">
                 <a:solidFill>
                   <a:srgbClr val="000000"/>
@@ -710,7 +710,7 @@
                 <a:spcPct val="100000"/>
               </a:lnSpc>
             </a:pPr>
-            <a:fld id="{6B157734-5120-4920-ADFC-76D2421EDA9D}" type="slidenum">
+            <a:fld id="{B78DC16F-4604-4561-BEFE-4287E707C18B}" type="slidenum">
               <a:rPr b="0" lang="en-CA" sz="1400" strike="noStrike" u="none">
                 <a:solidFill>
                   <a:srgbClr val="000000"/>
@@ -846,7 +846,7 @@
                 <a:spcPct val="100000"/>
               </a:lnSpc>
             </a:pPr>
-            <a:fld id="{73F07B88-AFBB-4774-9786-54A3D66E64C7}" type="slidenum">
+            <a:fld id="{40D225EE-36F0-46CF-8D48-E83F5234696C}" type="slidenum">
               <a:rPr b="0" lang="en-CA" sz="1400" strike="noStrike" u="none">
                 <a:solidFill>
                   <a:srgbClr val="000000"/>
@@ -982,7 +982,7 @@
                 <a:spcPct val="100000"/>
               </a:lnSpc>
             </a:pPr>
-            <a:fld id="{480B2D22-7481-42FD-A968-695B3D372FBA}" type="slidenum">
+            <a:fld id="{73894210-E94A-469D-A1B2-6A767FB16C13}" type="slidenum">
               <a:rPr b="0" lang="en-CA" sz="1400" strike="noStrike" u="none">
                 <a:solidFill>
                   <a:srgbClr val="000000"/>
@@ -1118,7 +1118,7 @@
                 <a:spcPct val="100000"/>
               </a:lnSpc>
             </a:pPr>
-            <a:fld id="{972B4AEC-E632-4998-B5DF-529A7427B04D}" type="slidenum">
+            <a:fld id="{9BFDF71C-69B8-41CA-A997-44CE9F4661D6}" type="slidenum">
               <a:rPr b="0" lang="en-CA" sz="1400" strike="noStrike" u="none">
                 <a:solidFill>
                   <a:srgbClr val="000000"/>
@@ -1254,7 +1254,7 @@
                 <a:spcPct val="100000"/>
               </a:lnSpc>
             </a:pPr>
-            <a:fld id="{842C3919-BDD7-4261-84AB-014E6CE2E464}" type="slidenum">
+            <a:fld id="{B4534C40-BB32-4890-887F-9C7D5264B5A9}" type="slidenum">
               <a:rPr b="0" lang="en-CA" sz="1400" strike="noStrike" u="none">
                 <a:solidFill>
                   <a:srgbClr val="000000"/>
@@ -1390,7 +1390,7 @@
                 <a:spcPct val="100000"/>
               </a:lnSpc>
             </a:pPr>
-            <a:fld id="{FFD1E585-AE32-4E45-BADB-2EF84D748A0E}" type="slidenum">
+            <a:fld id="{61596213-13D4-416C-9499-55C2BE6773E2}" type="slidenum">
               <a:rPr b="0" lang="en-CA" sz="1400" strike="noStrike" u="none">
                 <a:solidFill>
                   <a:srgbClr val="000000"/>
@@ -1526,7 +1526,7 @@
                 <a:spcPct val="100000"/>
               </a:lnSpc>
             </a:pPr>
-            <a:fld id="{91BE2C86-8C15-4B2F-992F-DB7D04A9DAB9}" type="slidenum">
+            <a:fld id="{CA935E10-42F3-41BE-9E59-88EEA8CE74B2}" type="slidenum">
               <a:rPr b="0" lang="en-CA" sz="1400" strike="noStrike" u="none">
                 <a:solidFill>
                   <a:srgbClr val="000000"/>
@@ -1662,7 +1662,7 @@
                 <a:spcPct val="100000"/>
               </a:lnSpc>
             </a:pPr>
-            <a:fld id="{D6CC72C7-D9F8-4F6E-967E-87F0763FBE00}" type="slidenum">
+            <a:fld id="{402A1DA8-1F86-4D56-8672-6436BE565556}" type="slidenum">
               <a:rPr b="0" lang="en-CA" sz="1400" strike="noStrike" u="none">
                 <a:solidFill>
                   <a:srgbClr val="000000"/>
@@ -2108,7 +2108,7 @@
         <p:txBody>
           <a:bodyPr/>
           <a:p>
-            <a:fld id="{3718B0E2-8079-4186-B36B-A8D36FE33DA3}" type="slidenum">
+            <a:fld id="{78CD1F9A-438C-4094-B554-0EA34EC1A00E}" type="slidenum">
               <a:t>&lt;#&gt;</a:t>
             </a:fld>
           </a:p>
@@ -2496,7 +2496,7 @@
         <p:txBody>
           <a:bodyPr/>
           <a:p>
-            <a:fld id="{1A05D820-0427-4763-929E-FBA4B95BE309}" type="slidenum">
+            <a:fld id="{841A16CE-F159-49D2-9763-4A876D2A180C}" type="slidenum">
               <a:t>&lt;#&gt;</a:t>
             </a:fld>
           </a:p>
@@ -2884,7 +2884,7 @@
         <p:txBody>
           <a:bodyPr/>
           <a:p>
-            <a:fld id="{C5CC04F0-E05C-47EF-9E41-C30B1C13CD39}" type="slidenum">
+            <a:fld id="{CC2343F2-CD91-478F-976C-48FE3F793CB9}" type="slidenum">
               <a:t>&lt;#&gt;</a:t>
             </a:fld>
           </a:p>
@@ -3272,7 +3272,7 @@
         <p:txBody>
           <a:bodyPr/>
           <a:p>
-            <a:fld id="{21C54587-EA3C-4E57-8E50-DD2F07CE40F4}" type="slidenum">
+            <a:fld id="{8DA4E094-05DC-4C11-9912-B868F845355F}" type="slidenum">
               <a:t>&lt;#&gt;</a:t>
             </a:fld>
           </a:p>
@@ -3660,7 +3660,7 @@
         <p:txBody>
           <a:bodyPr/>
           <a:p>
-            <a:fld id="{CE74AC9F-FCBF-43D6-9EF7-8020CCE2D9F3}" type="slidenum">
+            <a:fld id="{5DE51E8E-D419-4CE7-B3D3-10FED81C1547}" type="slidenum">
               <a:t>&lt;#&gt;</a:t>
             </a:fld>
           </a:p>
@@ -4048,7 +4048,7 @@
         <p:txBody>
           <a:bodyPr/>
           <a:p>
-            <a:fld id="{EC6A26F2-CB31-41F8-B360-6EF0B30112E7}" type="slidenum">
+            <a:fld id="{DD1B4E28-9FF7-4063-99EE-EDA440D7E21A}" type="slidenum">
               <a:t>&lt;#&gt;</a:t>
             </a:fld>
           </a:p>
@@ -4436,7 +4436,7 @@
         <p:txBody>
           <a:bodyPr/>
           <a:p>
-            <a:fld id="{50A106CF-956E-4A5E-A5BC-AB52EC5BBC32}" type="slidenum">
+            <a:fld id="{30A61D27-6627-4E25-94C0-456C1C9E8997}" type="slidenum">
               <a:t>&lt;#&gt;</a:t>
             </a:fld>
           </a:p>
@@ -4824,7 +4824,7 @@
         <p:txBody>
           <a:bodyPr/>
           <a:p>
-            <a:fld id="{FC7EFC5D-FA92-4678-9C1F-2A77B011E805}" type="slidenum">
+            <a:fld id="{4B4A38C0-1E7F-4AE5-B0E7-C56B82A4A779}" type="slidenum">
               <a:t>&lt;#&gt;</a:t>
             </a:fld>
           </a:p>
@@ -5252,7 +5252,7 @@
               </a:lnSpc>
               <a:buNone/>
             </a:pPr>
-            <a:fld id="{E5B7D1C2-215F-4CE5-BCC2-153ABD6AE729}" type="slidenum">
+            <a:fld id="{01DFAB8E-3F6B-4F5F-BB0B-F89F90BF53A9}" type="slidenum">
               <a:rPr b="0" lang="en-CA" sz="1400" strike="noStrike" u="none">
                 <a:solidFill>
                   <a:srgbClr val="000000"/>
@@ -5597,7 +5597,7 @@
               </a:lnSpc>
               <a:buNone/>
             </a:pPr>
-            <a:fld id="{E399FF53-4DF6-46DA-AF2E-EBF4807AC6D3}" type="slidenum">
+            <a:fld id="{EF2D3EDA-9EB5-403E-A86D-31F1BC39791A}" type="slidenum">
               <a:rPr b="0" lang="en-CA" sz="1400" strike="noStrike" u="none">
                 <a:solidFill>
                   <a:srgbClr val="000000"/>
@@ -6035,7 +6035,7 @@
               </a:lnSpc>
               <a:buNone/>
             </a:pPr>
-            <a:fld id="{7E9BA907-26DB-4506-AD14-A3F95DEA3510}" type="slidenum">
+            <a:fld id="{E436E1AD-074A-41E8-8A21-3AA0A5880231}" type="slidenum">
               <a:rPr b="0" lang="en-CA" sz="1400" strike="noStrike" u="none">
                 <a:solidFill>
                   <a:srgbClr val="000000"/>
@@ -6473,7 +6473,7 @@
               </a:lnSpc>
               <a:buNone/>
             </a:pPr>
-            <a:fld id="{1C478280-DA4F-4295-986D-0F16617A1EC8}" type="slidenum">
+            <a:fld id="{E5ED1465-F0E7-4D36-B147-02630E5A9E90}" type="slidenum">
               <a:rPr b="0" lang="en-CA" sz="1400" strike="noStrike" u="none">
                 <a:solidFill>
                   <a:srgbClr val="000000"/>
@@ -6712,7 +6712,7 @@
               </a:lnSpc>
               <a:buNone/>
             </a:pPr>
-            <a:fld id="{68E194B7-FB98-416A-B327-52EB0BD06580}" type="slidenum">
+            <a:fld id="{0DFFD404-32C5-4E34-B929-8739E301A833}" type="slidenum">
               <a:rPr b="0" lang="en-CA" sz="1400" strike="noStrike" u="none">
                 <a:solidFill>
                   <a:srgbClr val="000000"/>
@@ -7143,7 +7143,7 @@
               </a:lnSpc>
               <a:buNone/>
             </a:pPr>
-            <a:fld id="{596EAE35-549C-4D4D-85D0-64322C86A172}" type="slidenum">
+            <a:fld id="{548EBC51-5B9B-48EE-9162-8BB57F204247}" type="slidenum">
               <a:rPr b="0" lang="en-CA" sz="1400" strike="noStrike" u="none">
                 <a:solidFill>
                   <a:srgbClr val="000000"/>
@@ -7447,7 +7447,7 @@
               </a:lnSpc>
               <a:buNone/>
             </a:pPr>
-            <a:fld id="{E1C14116-AF01-41DC-807D-040F5CFF78FE}" type="slidenum">
+            <a:fld id="{110583CD-C59A-43BA-A50D-86ADBFE979D9}" type="slidenum">
               <a:rPr b="0" lang="en-CA" sz="1400" strike="noStrike" u="none">
                 <a:solidFill>
                   <a:srgbClr val="000000"/>
@@ -8068,7 +8068,7 @@
               </a:lnSpc>
               <a:buNone/>
             </a:pPr>
-            <a:fld id="{9DFB7E1D-222D-4665-B48F-91A5821A17CB}" type="slidenum">
+            <a:fld id="{6697F563-AE7A-4584-B627-B73985A1C69D}" type="slidenum">
               <a:rPr b="0" lang="en-CA" sz="1400" strike="noStrike" u="none">
                 <a:solidFill>
                   <a:srgbClr val="000000"/>
@@ -8809,7 +8809,7 @@
               </a:lnSpc>
               <a:buNone/>
             </a:pPr>
-            <a:fld id="{71D31B96-60F9-4A21-8B4B-97CE1E07FBF1}" type="slidenum">
+            <a:fld id="{65F542E9-68A4-4764-8DB0-F947E59D79E1}" type="slidenum">
               <a:rPr b="0" lang="en-CA" sz="1400" strike="noStrike" u="none">
                 <a:solidFill>
                   <a:srgbClr val="000000"/>
@@ -9080,7 +9080,7 @@
               </a:lnSpc>
               <a:buNone/>
             </a:pPr>
-            <a:fld id="{A155862C-1AE0-4444-B3AC-2D12FA24486D}" type="slidenum">
+            <a:fld id="{E6145980-E6B9-4F17-BA85-D0C6A1E2E44C}" type="slidenum">
               <a:rPr b="0" lang="en-CA" sz="1400" strike="noStrike" u="none">
                 <a:solidFill>
                   <a:srgbClr val="000000"/>
@@ -9310,7 +9310,7 @@
               </a:lnSpc>
               <a:buNone/>
             </a:pPr>
-            <a:fld id="{F1ED53EB-9018-4D0E-9641-64D87E000C29}" type="slidenum">
+            <a:fld id="{CA24C151-5E83-4331-815C-C989439037E2}" type="slidenum">
               <a:rPr b="0" lang="en-CA" sz="1400" strike="noStrike" u="none">
                 <a:solidFill>
                   <a:srgbClr val="000000"/>
@@ -9889,7 +9889,7 @@
               </a:lnSpc>
               <a:buNone/>
             </a:pPr>
-            <a:fld id="{06A1FB66-B7C6-4D47-BECC-B1A4A469FF78}" type="slidenum">
+            <a:fld id="{EDC633B7-EF43-4914-9826-02477E65C4A7}" type="slidenum">
               <a:rPr b="0" lang="en-CA" sz="1400" strike="noStrike" u="none">
                 <a:solidFill>
                   <a:srgbClr val="000000"/>
@@ -10465,7 +10465,7 @@
                           <a:latin typeface="Apple Symbols"/>
                           <a:ea typeface="Apple Symbols"/>
                         </a:rPr>
-                        <a:t>16,000,000 €</a:t>
+                        <a:t>$16,000,000</a:t>
                       </a:r>
                       <a:endParaRPr b="0" lang="en-CA" sz="1800" strike="noStrike" u="none">
                         <a:solidFill>
@@ -10565,7 +10565,7 @@
                           <a:latin typeface="Apple Symbols"/>
                           <a:ea typeface="Apple Symbols"/>
                         </a:rPr>
-                        <a:t>3,300,001 €</a:t>
+                        <a:t>$3,300,001</a:t>
                       </a:r>
                       <a:endParaRPr b="0" lang="en-CA" sz="1800" strike="noStrike" u="none">
                         <a:solidFill>
@@ -10665,7 +10665,7 @@
                           <a:latin typeface="Apple Symbols"/>
                           <a:ea typeface="Apple Symbols"/>
                         </a:rPr>
-                        <a:t>55,888 €</a:t>
+                        <a:t>$55,888</a:t>
                       </a:r>
                       <a:endParaRPr b="0" lang="en-CA" sz="1800" strike="noStrike" u="none">
                         <a:solidFill>
@@ -10765,7 +10765,7 @@
                           <a:latin typeface="Apple Symbols"/>
                           <a:ea typeface="Apple Symbols"/>
                         </a:rPr>
-                        <a:t>7,054,034 €</a:t>
+                        <a:t>$7,054,034</a:t>
                       </a:r>
                       <a:endParaRPr b="0" lang="en-CA" sz="1800" strike="noStrike" u="none">
                         <a:solidFill>
@@ -10865,7 +10865,7 @@
                           <a:latin typeface="Apple Symbols"/>
                           <a:ea typeface="Apple Symbols"/>
                         </a:rPr>
-                        <a:t>2,000,000 €</a:t>
+                        <a:t>$2,000,000</a:t>
                       </a:r>
                       <a:endParaRPr b="0" lang="en-CA" sz="1800" strike="noStrike" u="none">
                         <a:solidFill>
@@ -11107,7 +11107,7 @@
                           <a:latin typeface="Arial"/>
                           <a:ea typeface="PingFang SC"/>
                         </a:rPr>
-                        <a:t>16,000,000 €</a:t>
+                        <a:t>$16,000,000</a:t>
                       </a:r>
                       <a:endParaRPr b="0" lang="en-CA" sz="1100" strike="noStrike" u="none">
                         <a:solidFill>
@@ -11213,7 +11213,7 @@
                           <a:latin typeface="Arial"/>
                           <a:ea typeface="PingFang SC"/>
                         </a:rPr>
-                        <a:t>3,300,001 €</a:t>
+                        <a:t>$3,300,001</a:t>
                       </a:r>
                       <a:endParaRPr b="0" lang="en-CA" sz="1100" strike="noStrike" u="none">
                         <a:solidFill>
@@ -11319,7 +11319,7 @@
                           <a:latin typeface="Arial"/>
                           <a:ea typeface="PingFang SC"/>
                         </a:rPr>
-                        <a:t>55,888 €</a:t>
+                        <a:t>$55,888</a:t>
                       </a:r>
                       <a:endParaRPr b="0" lang="en-CA" sz="1100" strike="noStrike" u="none">
                         <a:solidFill>
@@ -11425,7 +11425,7 @@
                           <a:latin typeface="Arial"/>
                           <a:ea typeface="PingFang SC"/>
                         </a:rPr>
-                        <a:t>7,054,034 €</a:t>
+                        <a:t>$7,054,034</a:t>
                       </a:r>
                       <a:endParaRPr b="0" lang="en-CA" sz="1100" strike="noStrike" u="none">
                         <a:solidFill>
@@ -11531,7 +11531,7 @@
                           <a:latin typeface="Arial"/>
                           <a:ea typeface="PingFang SC"/>
                         </a:rPr>
-                        <a:t>2,000,000 €</a:t>
+                        <a:t>$2,000,000</a:t>
                       </a:r>
                       <a:endParaRPr b="0" lang="en-CA" sz="1100" strike="noStrike" u="none">
                         <a:solidFill>
@@ -12408,7 +12408,7 @@
                           <a:latin typeface="Apple Symbols"/>
                           <a:ea typeface="Apple Symbols"/>
                         </a:rPr>
-                        <a:t>16,000,000 €</a:t>
+                        <a:t>$16,000,000</a:t>
                       </a:r>
                       <a:endParaRPr b="0" lang="en-CA" sz="1800" strike="noStrike" u="none">
                         <a:solidFill>
@@ -12508,7 +12508,7 @@
                           <a:latin typeface="Apple Symbols"/>
                           <a:ea typeface="Apple Symbols"/>
                         </a:rPr>
-                        <a:t>3,300,001 €</a:t>
+                        <a:t>$3,300,001</a:t>
                       </a:r>
                       <a:endParaRPr b="0" lang="en-CA" sz="1800" strike="noStrike" u="none">
                         <a:solidFill>
@@ -12608,7 +12608,7 @@
                           <a:latin typeface="Apple Symbols"/>
                           <a:ea typeface="Apple Symbols"/>
                         </a:rPr>
-                        <a:t>55,888 €</a:t>
+                        <a:t>$55,888</a:t>
                       </a:r>
                       <a:endParaRPr b="0" lang="en-CA" sz="1800" strike="noStrike" u="none">
                         <a:solidFill>
@@ -12708,7 +12708,7 @@
                           <a:latin typeface="Apple Symbols"/>
                           <a:ea typeface="Apple Symbols"/>
                         </a:rPr>
-                        <a:t>7,054,034 €</a:t>
+                        <a:t>$7,054,034</a:t>
                       </a:r>
                       <a:endParaRPr b="0" lang="en-CA" sz="1800" strike="noStrike" u="none">
                         <a:solidFill>
@@ -12808,7 +12808,7 @@
                           <a:latin typeface="Apple Symbols"/>
                           <a:ea typeface="Apple Symbols"/>
                         </a:rPr>
-                        <a:t>2,000,000 €</a:t>
+                        <a:t>$2,000,000</a:t>
                       </a:r>
                       <a:endParaRPr b="0" lang="en-CA" sz="1800" strike="noStrike" u="none">
                         <a:solidFill>
@@ -13117,7 +13117,7 @@
                           <a:latin typeface="Apple Symbols"/>
                           <a:ea typeface="Apple Symbols"/>
                         </a:rPr>
-                        <a:t>16,000,000 €</a:t>
+                        <a:t>$16,000,000</a:t>
                       </a:r>
                       <a:endParaRPr b="0" lang="en-CA" sz="1800" strike="noStrike" u="none">
                         <a:solidFill>
@@ -13217,7 +13217,7 @@
                           <a:latin typeface="Apple Symbols"/>
                           <a:ea typeface="Apple Symbols"/>
                         </a:rPr>
-                        <a:t>3,300,001 €</a:t>
+                        <a:t>$3,300,001</a:t>
                       </a:r>
                       <a:endParaRPr b="0" lang="en-CA" sz="1800" strike="noStrike" u="none">
                         <a:solidFill>
@@ -13317,7 +13317,7 @@
                           <a:latin typeface="Apple Symbols"/>
                           <a:ea typeface="Apple Symbols"/>
                         </a:rPr>
-                        <a:t>55,888 €</a:t>
+                        <a:t>$55,888</a:t>
                       </a:r>
                       <a:endParaRPr b="0" lang="en-CA" sz="1800" strike="noStrike" u="none">
                         <a:solidFill>
@@ -13417,7 +13417,7 @@
                           <a:latin typeface="Apple Symbols"/>
                           <a:ea typeface="Apple Symbols"/>
                         </a:rPr>
-                        <a:t>7,054,034 €</a:t>
+                        <a:t>$7,054,034</a:t>
                       </a:r>
                       <a:endParaRPr b="0" lang="en-CA" sz="1800" strike="noStrike" u="none">
                         <a:solidFill>
@@ -13517,7 +13517,7 @@
                           <a:latin typeface="Apple Symbols"/>
                           <a:ea typeface="Apple Symbols"/>
                         </a:rPr>
-                        <a:t>2,000,000 €</a:t>
+                        <a:t>$2,000,000</a:t>
                       </a:r>
                       <a:endParaRPr b="0" lang="en-CA" sz="1800" strike="noStrike" u="none">
                         <a:solidFill>
@@ -13826,7 +13826,7 @@
                           <a:latin typeface="Apple Symbols"/>
                           <a:ea typeface="Apple Symbols"/>
                         </a:rPr>
-                        <a:t>16,000,000 €</a:t>
+                        <a:t>$16,000,000</a:t>
                       </a:r>
                       <a:endParaRPr b="0" lang="en-CA" sz="1800" strike="noStrike" u="none">
                         <a:solidFill>
@@ -13926,7 +13926,7 @@
                           <a:latin typeface="Apple Symbols"/>
                           <a:ea typeface="Apple Symbols"/>
                         </a:rPr>
-                        <a:t>3,300,001 €</a:t>
+                        <a:t>$3,300,001</a:t>
                       </a:r>
                       <a:endParaRPr b="0" lang="en-CA" sz="1800" strike="noStrike" u="none">
                         <a:solidFill>
@@ -14026,7 +14026,7 @@
                           <a:latin typeface="Apple Symbols"/>
                           <a:ea typeface="Apple Symbols"/>
                         </a:rPr>
-                        <a:t>55,888 €</a:t>
+                        <a:t>$55,888</a:t>
                       </a:r>
                       <a:endParaRPr b="0" lang="en-CA" sz="1800" strike="noStrike" u="none">
                         <a:solidFill>
@@ -14126,7 +14126,7 @@
                           <a:latin typeface="Apple Symbols"/>
                           <a:ea typeface="Apple Symbols"/>
                         </a:rPr>
-                        <a:t>7,054,034 €</a:t>
+                        <a:t>$7,054,034</a:t>
                       </a:r>
                       <a:endParaRPr b="0" lang="en-CA" sz="1800" strike="noStrike" u="none">
                         <a:solidFill>
@@ -14226,7 +14226,7 @@
                           <a:latin typeface="Apple Symbols"/>
                           <a:ea typeface="Apple Symbols"/>
                         </a:rPr>
-                        <a:t>2,000,000 €</a:t>
+                        <a:t>$2,000,000</a:t>
                       </a:r>
                       <a:endParaRPr b="0" lang="en-CA" sz="1800" strike="noStrike" u="none">
                         <a:solidFill>
@@ -14535,7 +14535,7 @@
                           <a:latin typeface="Apple Symbols"/>
                           <a:ea typeface="Apple Symbols"/>
                         </a:rPr>
-                        <a:t>16,000,000 €</a:t>
+                        <a:t>$16,000,000</a:t>
                       </a:r>
                       <a:endParaRPr b="0" lang="en-CA" sz="1800" strike="noStrike" u="none">
                         <a:solidFill>
@@ -14635,7 +14635,7 @@
                           <a:latin typeface="Apple Symbols"/>
                           <a:ea typeface="Apple Symbols"/>
                         </a:rPr>
-                        <a:t>3,300,001 €</a:t>
+                        <a:t>$3,300,001</a:t>
                       </a:r>
                       <a:endParaRPr b="0" lang="en-CA" sz="1800" strike="noStrike" u="none">
                         <a:solidFill>
@@ -14735,7 +14735,7 @@
                           <a:latin typeface="Apple Symbols"/>
                           <a:ea typeface="Apple Symbols"/>
                         </a:rPr>
-                        <a:t>55,888 €</a:t>
+                        <a:t>$55,888</a:t>
                       </a:r>
                       <a:endParaRPr b="0" lang="en-CA" sz="1800" strike="noStrike" u="none">
                         <a:solidFill>
@@ -14835,7 +14835,7 @@
                           <a:latin typeface="Apple Symbols"/>
                           <a:ea typeface="Apple Symbols"/>
                         </a:rPr>
-                        <a:t>7,054,034 €</a:t>
+                        <a:t>$7,054,034</a:t>
                       </a:r>
                       <a:endParaRPr b="0" lang="en-CA" sz="1800" strike="noStrike" u="none">
                         <a:solidFill>
@@ -14935,7 +14935,7 @@
                           <a:latin typeface="Apple Symbols"/>
                           <a:ea typeface="Apple Symbols"/>
                         </a:rPr>
-                        <a:t>2,000,000 €</a:t>
+                        <a:t>$2,000,000</a:t>
                       </a:r>
                       <a:endParaRPr b="0" lang="en-CA" sz="1800" strike="noStrike" u="none">
                         <a:solidFill>
@@ -15260,7 +15260,7 @@
                           <a:latin typeface="Apple Symbols"/>
                           <a:ea typeface="Apple Symbols"/>
                         </a:rPr>
-                        <a:t>16,000,000 €</a:t>
+                        <a:t>$16,000,000</a:t>
                       </a:r>
                       <a:endParaRPr b="0" lang="en-CA" sz="1800" strike="noStrike" u="none">
                         <a:solidFill>
@@ -15360,7 +15360,7 @@
                           <a:latin typeface="Apple Symbols"/>
                           <a:ea typeface="Apple Symbols"/>
                         </a:rPr>
-                        <a:t>3,300,001 €</a:t>
+                        <a:t>$3,300,001</a:t>
                       </a:r>
                       <a:endParaRPr b="0" lang="en-CA" sz="1800" strike="noStrike" u="none">
                         <a:solidFill>
@@ -15460,7 +15460,7 @@
                           <a:latin typeface="Apple Symbols"/>
                           <a:ea typeface="Apple Symbols"/>
                         </a:rPr>
-                        <a:t>55,888 €</a:t>
+                        <a:t>$55,888</a:t>
                       </a:r>
                       <a:endParaRPr b="0" lang="en-CA" sz="1800" strike="noStrike" u="none">
                         <a:solidFill>
@@ -15560,7 +15560,7 @@
                           <a:latin typeface="Apple Symbols"/>
                           <a:ea typeface="Apple Symbols"/>
                         </a:rPr>
-                        <a:t>7,054,034 €</a:t>
+                        <a:t>$7,054,034</a:t>
                       </a:r>
                       <a:endParaRPr b="0" lang="en-CA" sz="1800" strike="noStrike" u="none">
                         <a:solidFill>
@@ -15660,7 +15660,7 @@
                           <a:latin typeface="Apple Symbols"/>
                           <a:ea typeface="Apple Symbols"/>
                         </a:rPr>
-                        <a:t>2,000,000 €</a:t>
+                        <a:t>$2,000,000</a:t>
                       </a:r>
                       <a:endParaRPr b="0" lang="en-CA" sz="1800" strike="noStrike" u="none">
                         <a:solidFill>
@@ -15974,7 +15974,7 @@
                           <a:latin typeface="Apple Symbols"/>
                           <a:ea typeface="Apple Symbols"/>
                         </a:rPr>
-                        <a:t>16,000,000 €</a:t>
+                        <a:t>$16,000,000</a:t>
                       </a:r>
                       <a:endParaRPr b="0" lang="en-CA" sz="1800" strike="noStrike" u="none">
                         <a:solidFill>
@@ -16074,7 +16074,7 @@
                           <a:latin typeface="Apple Symbols"/>
                           <a:ea typeface="Apple Symbols"/>
                         </a:rPr>
-                        <a:t>3,300,001 €</a:t>
+                        <a:t>$3,300,001</a:t>
                       </a:r>
                       <a:endParaRPr b="0" lang="en-CA" sz="1800" strike="noStrike" u="none">
                         <a:solidFill>
@@ -16174,7 +16174,7 @@
                           <a:latin typeface="Apple Symbols"/>
                           <a:ea typeface="Apple Symbols"/>
                         </a:rPr>
-                        <a:t>55,888 €</a:t>
+                        <a:t>$55,888</a:t>
                       </a:r>
                       <a:endParaRPr b="0" lang="en-CA" sz="1800" strike="noStrike" u="none">
                         <a:solidFill>
@@ -16274,7 +16274,7 @@
                           <a:latin typeface="Apple Symbols"/>
                           <a:ea typeface="Apple Symbols"/>
                         </a:rPr>
-                        <a:t>7,054,034 €</a:t>
+                        <a:t>$7,054,034</a:t>
                       </a:r>
                       <a:endParaRPr b="0" lang="en-CA" sz="1800" strike="noStrike" u="none">
                         <a:solidFill>
@@ -16374,7 +16374,7 @@
                           <a:latin typeface="Apple Symbols"/>
                           <a:ea typeface="Apple Symbols"/>
                         </a:rPr>
-                        <a:t>2,000,000 €</a:t>
+                        <a:t>$2,000,000</a:t>
                       </a:r>
                       <a:endParaRPr b="0" lang="en-CA" sz="1800" strike="noStrike" u="none">
                         <a:solidFill>
@@ -16705,7 +16705,7 @@
                           <a:latin typeface="Apple Symbols"/>
                           <a:ea typeface="Apple Symbols"/>
                         </a:rPr>
-                        <a:t>16,000,000 €</a:t>
+                        <a:t>$16,000,000</a:t>
                       </a:r>
                       <a:endParaRPr b="0" lang="en-CA" sz="1800" strike="noStrike" u="none">
                         <a:solidFill>
@@ -16805,7 +16805,7 @@
                           <a:latin typeface="Apple Symbols"/>
                           <a:ea typeface="Apple Symbols"/>
                         </a:rPr>
-                        <a:t>3,300,001 €</a:t>
+                        <a:t>$3,300,001</a:t>
                       </a:r>
                       <a:endParaRPr b="0" lang="en-CA" sz="1800" strike="noStrike" u="none">
                         <a:solidFill>
@@ -16905,7 +16905,7 @@
                           <a:latin typeface="Apple Symbols"/>
                           <a:ea typeface="Apple Symbols"/>
                         </a:rPr>
-                        <a:t>55,888 €</a:t>
+                        <a:t>$55,888</a:t>
                       </a:r>
                       <a:endParaRPr b="0" lang="en-CA" sz="1800" strike="noStrike" u="none">
                         <a:solidFill>
@@ -17005,7 +17005,7 @@
                           <a:latin typeface="Apple Symbols"/>
                           <a:ea typeface="Apple Symbols"/>
                         </a:rPr>
-                        <a:t>7,054,034 €</a:t>
+                        <a:t>$7,054,034</a:t>
                       </a:r>
                       <a:endParaRPr b="0" lang="en-CA" sz="1800" strike="noStrike" u="none">
                         <a:solidFill>
@@ -17105,7 +17105,7 @@
                           <a:latin typeface="Apple Symbols"/>
                           <a:ea typeface="Apple Symbols"/>
                         </a:rPr>
-                        <a:t>2,000,000 €</a:t>
+                        <a:t>$2,000,000</a:t>
                       </a:r>
                       <a:endParaRPr b="0" lang="en-CA" sz="1800" strike="noStrike" u="none">
                         <a:solidFill>

</xml_diff>